<commit_message>
Updates for week 4
</commit_message>
<xml_diff>
--- a/Lectures/Week_4/CSE 599V Lecture 10 - Estimating Confidence in Models and Parameters- II .pptx
+++ b/Lectures/Week_4/CSE 599V Lecture 10 - Estimating Confidence in Models and Parameters- II .pptx
@@ -5,15 +5,18 @@
     <p:sldMasterId id="2147483648" r:id="rId1"/>
   </p:sldMasterIdLst>
   <p:notesMasterIdLst>
-    <p:notesMasterId r:id="rId5"/>
+    <p:notesMasterId r:id="rId8"/>
   </p:notesMasterIdLst>
   <p:handoutMasterIdLst>
-    <p:handoutMasterId r:id="rId6"/>
+    <p:handoutMasterId r:id="rId9"/>
   </p:handoutMasterIdLst>
   <p:sldIdLst>
     <p:sldId id="347" r:id="rId2"/>
     <p:sldId id="348" r:id="rId3"/>
     <p:sldId id="349" r:id="rId4"/>
+    <p:sldId id="352" r:id="rId5"/>
+    <p:sldId id="350" r:id="rId6"/>
+    <p:sldId id="351" r:id="rId7"/>
   </p:sldIdLst>
   <p:sldSz cx="9144000" cy="6858000" type="screen4x3"/>
   <p:notesSz cx="6858000" cy="9144000"/>
@@ -284,7 +287,7 @@
               <a:pPr>
                 <a:defRPr/>
               </a:pPr>
-              <a:t>10/22/18</a:t>
+              <a:t>10/23/18</a:t>
             </a:fld>
             <a:endParaRPr lang="en-US" altLang="x-none"/>
           </a:p>
@@ -493,7 +496,7 @@
               <a:pPr>
                 <a:defRPr/>
               </a:pPr>
-              <a:t>10/22/18</a:t>
+              <a:t>10/23/18</a:t>
             </a:fld>
             <a:endParaRPr lang="en-US" altLang="x-none"/>
           </a:p>
@@ -5360,7 +5363,10 @@
           <a:bodyPr/>
           <a:lstStyle/>
           <a:p>
-            <a:endParaRPr lang="en-US" dirty="0"/>
+            <a:r>
+              <a:rPr lang="en-US" dirty="0"/>
+              <a:t>Cross Validation Basics</a:t>
+            </a:r>
           </a:p>
         </p:txBody>
       </p:sp>
@@ -5385,7 +5391,34 @@
           <a:bodyPr/>
           <a:lstStyle/>
           <a:p>
-            <a:endParaRPr lang="en-US"/>
+            <a:r>
+              <a:rPr lang="en-US" dirty="0"/>
+              <a:t>Purpose: Estimate model quality</a:t>
+            </a:r>
+          </a:p>
+          <a:p>
+            <a:r>
+              <a:rPr lang="en-US" dirty="0"/>
+              <a:t>Folds</a:t>
+            </a:r>
+          </a:p>
+          <a:p>
+            <a:r>
+              <a:rPr lang="en-US" dirty="0"/>
+              <a:t>Training and test data</a:t>
+            </a:r>
+          </a:p>
+          <a:p>
+            <a:r>
+              <a:rPr lang="en-US" dirty="0"/>
+              <a:t>Theory</a:t>
+            </a:r>
+          </a:p>
+          <a:p>
+            <a:r>
+              <a:rPr lang="en-US" dirty="0"/>
+              <a:t>Variance vs. bias trade-off</a:t>
+            </a:r>
           </a:p>
         </p:txBody>
       </p:sp>
@@ -5428,6 +5461,4502 @@
     <p:extLst>
       <p:ext uri="{BB962C8B-B14F-4D97-AF65-F5344CB8AC3E}">
         <p14:creationId xmlns:p14="http://schemas.microsoft.com/office/powerpoint/2010/main" val="3889720431"/>
+      </p:ext>
+    </p:extLst>
+  </p:cSld>
+  <p:clrMapOvr>
+    <a:masterClrMapping/>
+  </p:clrMapOvr>
+</p:sld>
+</file>
+
+<file path=ppt/slides/slide4.xml><?xml version="1.0" encoding="utf-8"?>
+<p:sld xmlns:a="http://schemas.openxmlformats.org/drawingml/2006/main" xmlns:r="http://schemas.openxmlformats.org/officeDocument/2006/relationships" xmlns:p="http://schemas.openxmlformats.org/presentationml/2006/main">
+  <p:cSld>
+    <p:spTree>
+      <p:nvGrpSpPr>
+        <p:cNvPr id="1" name=""/>
+        <p:cNvGrpSpPr/>
+        <p:nvPr/>
+      </p:nvGrpSpPr>
+      <p:grpSpPr>
+        <a:xfrm>
+          <a:off x="0" y="0"/>
+          <a:ext cx="0" cy="0"/>
+          <a:chOff x="0" y="0"/>
+          <a:chExt cx="0" cy="0"/>
+        </a:xfrm>
+      </p:grpSpPr>
+      <p:sp>
+        <p:nvSpPr>
+          <p:cNvPr id="2" name="Title 1">
+            <a:extLst>
+              <a:ext uri="{FF2B5EF4-FFF2-40B4-BE49-F238E27FC236}">
+                <a16:creationId xmlns:a16="http://schemas.microsoft.com/office/drawing/2014/main" id="{BE365F2C-AE53-374A-92E6-43CA22DB77DA}"/>
+              </a:ext>
+            </a:extLst>
+          </p:cNvPr>
+          <p:cNvSpPr>
+            <a:spLocks noGrp="1"/>
+          </p:cNvSpPr>
+          <p:nvPr>
+            <p:ph type="title"/>
+          </p:nvPr>
+        </p:nvSpPr>
+        <p:spPr/>
+        <p:txBody>
+          <a:bodyPr/>
+          <a:lstStyle/>
+          <a:p>
+            <a:r>
+              <a:rPr lang="en-US" dirty="0"/>
+              <a:t>Cross Validation Workflow</a:t>
+            </a:r>
+          </a:p>
+        </p:txBody>
+      </p:sp>
+      <p:sp>
+        <p:nvSpPr>
+          <p:cNvPr id="4" name="Slide Number Placeholder 3">
+            <a:extLst>
+              <a:ext uri="{FF2B5EF4-FFF2-40B4-BE49-F238E27FC236}">
+                <a16:creationId xmlns:a16="http://schemas.microsoft.com/office/drawing/2014/main" id="{BDFF67F1-0B9B-EA43-ADF5-B64D6CD8E081}"/>
+              </a:ext>
+            </a:extLst>
+          </p:cNvPr>
+          <p:cNvSpPr>
+            <a:spLocks noGrp="1"/>
+          </p:cNvSpPr>
+          <p:nvPr>
+            <p:ph type="sldNum" sz="quarter" idx="11"/>
+          </p:nvPr>
+        </p:nvSpPr>
+        <p:spPr/>
+        <p:txBody>
+          <a:bodyPr/>
+          <a:lstStyle/>
+          <a:p>
+            <a:pPr>
+              <a:defRPr/>
+            </a:pPr>
+            <a:fld id="{3EF4E9CC-9D91-476E-91FD-5BEEC1642931}" type="slidenum">
+              <a:rPr lang="en-US" altLang="x-none" smtClean="0"/>
+              <a:pPr>
+                <a:defRPr/>
+              </a:pPr>
+              <a:t>4</a:t>
+            </a:fld>
+            <a:endParaRPr lang="en-US" altLang="x-none"/>
+          </a:p>
+        </p:txBody>
+      </p:sp>
+      <p:sp>
+        <p:nvSpPr>
+          <p:cNvPr id="5" name="Rectangle 4">
+            <a:extLst>
+              <a:ext uri="{FF2B5EF4-FFF2-40B4-BE49-F238E27FC236}">
+                <a16:creationId xmlns:a16="http://schemas.microsoft.com/office/drawing/2014/main" id="{86972A79-AFD0-7B43-98BE-13188C126C46}"/>
+              </a:ext>
+            </a:extLst>
+          </p:cNvPr>
+          <p:cNvSpPr/>
+          <p:nvPr/>
+        </p:nvSpPr>
+        <p:spPr>
+          <a:xfrm>
+            <a:off x="1219200" y="1219200"/>
+            <a:ext cx="2971800" cy="914400"/>
+          </a:xfrm>
+          <a:prstGeom prst="rect">
+            <a:avLst/>
+          </a:prstGeom>
+        </p:spPr>
+        <p:style>
+          <a:lnRef idx="1">
+            <a:schemeClr val="accent1"/>
+          </a:lnRef>
+          <a:fillRef idx="3">
+            <a:schemeClr val="accent1"/>
+          </a:fillRef>
+          <a:effectRef idx="2">
+            <a:schemeClr val="accent1"/>
+          </a:effectRef>
+          <a:fontRef idx="minor">
+            <a:schemeClr val="lt1"/>
+          </a:fontRef>
+        </p:style>
+        <p:txBody>
+          <a:bodyPr rtlCol="0" anchor="ctr"/>
+          <a:lstStyle/>
+          <a:p>
+            <a:pPr algn="ctr"/>
+            <a:r>
+              <a:rPr lang="en-US" sz="2400" b="1" dirty="0"/>
+              <a:t>Divide full data set into </a:t>
+            </a:r>
+            <a:r>
+              <a:rPr lang="en-US" sz="2400" b="1" i="1" dirty="0"/>
+              <a:t>N</a:t>
+            </a:r>
+            <a:r>
+              <a:rPr lang="en-US" sz="2400" b="1" dirty="0"/>
+              <a:t> Folds</a:t>
+            </a:r>
+          </a:p>
+        </p:txBody>
+      </p:sp>
+      <p:sp>
+        <p:nvSpPr>
+          <p:cNvPr id="6" name="Rectangle 5">
+            <a:extLst>
+              <a:ext uri="{FF2B5EF4-FFF2-40B4-BE49-F238E27FC236}">
+                <a16:creationId xmlns:a16="http://schemas.microsoft.com/office/drawing/2014/main" id="{74837913-787B-804F-B077-ABC3DD76D40F}"/>
+              </a:ext>
+            </a:extLst>
+          </p:cNvPr>
+          <p:cNvSpPr/>
+          <p:nvPr/>
+        </p:nvSpPr>
+        <p:spPr>
+          <a:xfrm>
+            <a:off x="762000" y="2590800"/>
+            <a:ext cx="3657600" cy="914400"/>
+          </a:xfrm>
+          <a:prstGeom prst="rect">
+            <a:avLst/>
+          </a:prstGeom>
+        </p:spPr>
+        <p:style>
+          <a:lnRef idx="1">
+            <a:schemeClr val="accent1"/>
+          </a:lnRef>
+          <a:fillRef idx="3">
+            <a:schemeClr val="accent1"/>
+          </a:fillRef>
+          <a:effectRef idx="2">
+            <a:schemeClr val="accent1"/>
+          </a:effectRef>
+          <a:fontRef idx="minor">
+            <a:schemeClr val="lt1"/>
+          </a:fontRef>
+        </p:style>
+        <p:txBody>
+          <a:bodyPr rtlCol="0" anchor="ctr"/>
+          <a:lstStyle/>
+          <a:p>
+            <a:pPr algn="ctr"/>
+            <a:r>
+              <a:rPr lang="en-US" sz="2400" b="1" dirty="0"/>
+              <a:t>Construct </a:t>
+            </a:r>
+            <a:r>
+              <a:rPr lang="en-US" sz="2400" b="1" i="1" dirty="0"/>
+              <a:t>N</a:t>
+            </a:r>
+            <a:r>
+              <a:rPr lang="en-US" sz="2400" b="1" dirty="0"/>
+              <a:t> training data sets and </a:t>
+            </a:r>
+            <a:r>
+              <a:rPr lang="en-US" sz="2400" b="1" i="1" dirty="0"/>
+              <a:t>N</a:t>
+            </a:r>
+            <a:r>
+              <a:rPr lang="en-US" sz="2400" b="1" dirty="0"/>
+              <a:t> test data sets</a:t>
+            </a:r>
+          </a:p>
+        </p:txBody>
+      </p:sp>
+      <p:sp>
+        <p:nvSpPr>
+          <p:cNvPr id="7" name="Rectangle 6">
+            <a:extLst>
+              <a:ext uri="{FF2B5EF4-FFF2-40B4-BE49-F238E27FC236}">
+                <a16:creationId xmlns:a16="http://schemas.microsoft.com/office/drawing/2014/main" id="{10295FAE-F9F0-9D44-ADBA-8123F3B09B1A}"/>
+              </a:ext>
+            </a:extLst>
+          </p:cNvPr>
+          <p:cNvSpPr/>
+          <p:nvPr/>
+        </p:nvSpPr>
+        <p:spPr>
+          <a:xfrm>
+            <a:off x="1219200" y="3962400"/>
+            <a:ext cx="2971800" cy="914400"/>
+          </a:xfrm>
+          <a:prstGeom prst="rect">
+            <a:avLst/>
+          </a:prstGeom>
+        </p:spPr>
+        <p:style>
+          <a:lnRef idx="1">
+            <a:schemeClr val="accent1"/>
+          </a:lnRef>
+          <a:fillRef idx="3">
+            <a:schemeClr val="accent1"/>
+          </a:fillRef>
+          <a:effectRef idx="2">
+            <a:schemeClr val="accent1"/>
+          </a:effectRef>
+          <a:fontRef idx="minor">
+            <a:schemeClr val="lt1"/>
+          </a:fontRef>
+        </p:style>
+        <p:txBody>
+          <a:bodyPr rtlCol="0" anchor="ctr"/>
+          <a:lstStyle/>
+          <a:p>
+            <a:pPr algn="ctr"/>
+            <a:r>
+              <a:rPr lang="en-US" sz="2400" b="1" dirty="0"/>
+              <a:t>Obtain </a:t>
+            </a:r>
+            <a:r>
+              <a:rPr lang="en-US" sz="2400" b="1" i="1" dirty="0"/>
+              <a:t>N</a:t>
+            </a:r>
+            <a:r>
+              <a:rPr lang="en-US" sz="2400" b="1" dirty="0"/>
+              <a:t> evaluations of the model</a:t>
+            </a:r>
+          </a:p>
+        </p:txBody>
+      </p:sp>
+      <p:sp>
+        <p:nvSpPr>
+          <p:cNvPr id="8" name="Rectangle 7">
+            <a:extLst>
+              <a:ext uri="{FF2B5EF4-FFF2-40B4-BE49-F238E27FC236}">
+                <a16:creationId xmlns:a16="http://schemas.microsoft.com/office/drawing/2014/main" id="{D44D0E68-3444-F84E-9E75-93D0FCF24EAE}"/>
+              </a:ext>
+            </a:extLst>
+          </p:cNvPr>
+          <p:cNvSpPr/>
+          <p:nvPr/>
+        </p:nvSpPr>
+        <p:spPr>
+          <a:xfrm>
+            <a:off x="1219200" y="5317435"/>
+            <a:ext cx="2971800" cy="914400"/>
+          </a:xfrm>
+          <a:prstGeom prst="rect">
+            <a:avLst/>
+          </a:prstGeom>
+        </p:spPr>
+        <p:style>
+          <a:lnRef idx="1">
+            <a:schemeClr val="accent1"/>
+          </a:lnRef>
+          <a:fillRef idx="3">
+            <a:schemeClr val="accent1"/>
+          </a:fillRef>
+          <a:effectRef idx="2">
+            <a:schemeClr val="accent1"/>
+          </a:effectRef>
+          <a:fontRef idx="minor">
+            <a:schemeClr val="lt1"/>
+          </a:fontRef>
+        </p:style>
+        <p:txBody>
+          <a:bodyPr rtlCol="0" anchor="ctr"/>
+          <a:lstStyle/>
+          <a:p>
+            <a:pPr algn="ctr"/>
+            <a:r>
+              <a:rPr lang="en-US" sz="2400" b="1" dirty="0"/>
+              <a:t>Report statistics of the evaluations</a:t>
+            </a:r>
+          </a:p>
+        </p:txBody>
+      </p:sp>
+      <p:cxnSp>
+        <p:nvCxnSpPr>
+          <p:cNvPr id="10" name="Straight Arrow Connector 9">
+            <a:extLst>
+              <a:ext uri="{FF2B5EF4-FFF2-40B4-BE49-F238E27FC236}">
+                <a16:creationId xmlns:a16="http://schemas.microsoft.com/office/drawing/2014/main" id="{83A4E811-B290-374E-956E-AB9781A6CCF7}"/>
+              </a:ext>
+            </a:extLst>
+          </p:cNvPr>
+          <p:cNvCxnSpPr/>
+          <p:nvPr/>
+        </p:nvCxnSpPr>
+        <p:spPr>
+          <a:xfrm>
+            <a:off x="2705100" y="2133600"/>
+            <a:ext cx="0" cy="457200"/>
+          </a:xfrm>
+          <a:prstGeom prst="straightConnector1">
+            <a:avLst/>
+          </a:prstGeom>
+          <a:ln>
+            <a:tailEnd type="triangle"/>
+          </a:ln>
+        </p:spPr>
+        <p:style>
+          <a:lnRef idx="2">
+            <a:schemeClr val="accent1"/>
+          </a:lnRef>
+          <a:fillRef idx="0">
+            <a:schemeClr val="accent1"/>
+          </a:fillRef>
+          <a:effectRef idx="1">
+            <a:schemeClr val="accent1"/>
+          </a:effectRef>
+          <a:fontRef idx="minor">
+            <a:schemeClr val="tx1"/>
+          </a:fontRef>
+        </p:style>
+      </p:cxnSp>
+      <p:cxnSp>
+        <p:nvCxnSpPr>
+          <p:cNvPr id="14" name="Straight Arrow Connector 13">
+            <a:extLst>
+              <a:ext uri="{FF2B5EF4-FFF2-40B4-BE49-F238E27FC236}">
+                <a16:creationId xmlns:a16="http://schemas.microsoft.com/office/drawing/2014/main" id="{2BF477F8-2B42-5B40-AE75-274B5CBF0817}"/>
+              </a:ext>
+            </a:extLst>
+          </p:cNvPr>
+          <p:cNvCxnSpPr>
+            <a:cxnSpLocks/>
+          </p:cNvCxnSpPr>
+          <p:nvPr/>
+        </p:nvCxnSpPr>
+        <p:spPr>
+          <a:xfrm>
+            <a:off x="2667000" y="4876800"/>
+            <a:ext cx="0" cy="457200"/>
+          </a:xfrm>
+          <a:prstGeom prst="straightConnector1">
+            <a:avLst/>
+          </a:prstGeom>
+          <a:ln>
+            <a:tailEnd type="triangle"/>
+          </a:ln>
+        </p:spPr>
+        <p:style>
+          <a:lnRef idx="2">
+            <a:schemeClr val="accent1"/>
+          </a:lnRef>
+          <a:fillRef idx="0">
+            <a:schemeClr val="accent1"/>
+          </a:fillRef>
+          <a:effectRef idx="1">
+            <a:schemeClr val="accent1"/>
+          </a:effectRef>
+          <a:fontRef idx="minor">
+            <a:schemeClr val="tx1"/>
+          </a:fontRef>
+        </p:style>
+      </p:cxnSp>
+      <p:graphicFrame>
+        <p:nvGraphicFramePr>
+          <p:cNvPr id="18" name="Table 17">
+            <a:extLst>
+              <a:ext uri="{FF2B5EF4-FFF2-40B4-BE49-F238E27FC236}">
+                <a16:creationId xmlns:a16="http://schemas.microsoft.com/office/drawing/2014/main" id="{EF9B0715-5F1D-E449-8B55-BDD49668B3C7}"/>
+              </a:ext>
+            </a:extLst>
+          </p:cNvPr>
+          <p:cNvGraphicFramePr>
+            <a:graphicFrameLocks noGrp="1"/>
+          </p:cNvGraphicFramePr>
+          <p:nvPr>
+            <p:extLst>
+              <p:ext uri="{D42A27DB-BD31-4B8C-83A1-F6EECF244321}">
+                <p14:modId xmlns:p14="http://schemas.microsoft.com/office/powerpoint/2010/main" val="2180508740"/>
+              </p:ext>
+            </p:extLst>
+          </p:nvPr>
+        </p:nvGraphicFramePr>
+        <p:xfrm>
+          <a:off x="7543800" y="381000"/>
+          <a:ext cx="833120" cy="817880"/>
+        </p:xfrm>
+        <a:graphic>
+          <a:graphicData uri="http://schemas.openxmlformats.org/drawingml/2006/table">
+            <a:tbl>
+              <a:tblPr firstRow="1" bandRow="1">
+                <a:tableStyleId>{5C22544A-7EE6-4342-B048-85BDC9FD1C3A}</a:tableStyleId>
+              </a:tblPr>
+              <a:tblGrid>
+                <a:gridCol w="208280">
+                  <a:extLst>
+                    <a:ext uri="{9D8B030D-6E8A-4147-A177-3AD203B41FA5}">
+                      <a16:colId xmlns:a16="http://schemas.microsoft.com/office/drawing/2014/main" val="2850824769"/>
+                    </a:ext>
+                  </a:extLst>
+                </a:gridCol>
+                <a:gridCol w="208280">
+                  <a:extLst>
+                    <a:ext uri="{9D8B030D-6E8A-4147-A177-3AD203B41FA5}">
+                      <a16:colId xmlns:a16="http://schemas.microsoft.com/office/drawing/2014/main" val="57343624"/>
+                    </a:ext>
+                  </a:extLst>
+                </a:gridCol>
+                <a:gridCol w="208280">
+                  <a:extLst>
+                    <a:ext uri="{9D8B030D-6E8A-4147-A177-3AD203B41FA5}">
+                      <a16:colId xmlns:a16="http://schemas.microsoft.com/office/drawing/2014/main" val="2298198695"/>
+                    </a:ext>
+                  </a:extLst>
+                </a:gridCol>
+                <a:gridCol w="208280">
+                  <a:extLst>
+                    <a:ext uri="{9D8B030D-6E8A-4147-A177-3AD203B41FA5}">
+                      <a16:colId xmlns:a16="http://schemas.microsoft.com/office/drawing/2014/main" val="3269445081"/>
+                    </a:ext>
+                  </a:extLst>
+                </a:gridCol>
+              </a:tblGrid>
+              <a:tr h="0">
+                <a:tc>
+                  <a:txBody>
+                    <a:bodyPr/>
+                    <a:lstStyle/>
+                    <a:p>
+                      <a:endParaRPr lang="en-US" sz="100" dirty="0"/>
+                    </a:p>
+                  </a:txBody>
+                  <a:tcPr/>
+                </a:tc>
+                <a:tc>
+                  <a:txBody>
+                    <a:bodyPr/>
+                    <a:lstStyle/>
+                    <a:p>
+                      <a:endParaRPr lang="en-US" sz="100"/>
+                    </a:p>
+                  </a:txBody>
+                  <a:tcPr/>
+                </a:tc>
+                <a:tc>
+                  <a:txBody>
+                    <a:bodyPr/>
+                    <a:lstStyle/>
+                    <a:p>
+                      <a:endParaRPr lang="en-US" sz="100"/>
+                    </a:p>
+                  </a:txBody>
+                  <a:tcPr/>
+                </a:tc>
+                <a:tc>
+                  <a:txBody>
+                    <a:bodyPr/>
+                    <a:lstStyle/>
+                    <a:p>
+                      <a:endParaRPr lang="en-US" sz="100"/>
+                    </a:p>
+                  </a:txBody>
+                  <a:tcPr/>
+                </a:tc>
+                <a:extLst>
+                  <a:ext uri="{0D108BD9-81ED-4DB2-BD59-A6C34878D82A}">
+                    <a16:rowId xmlns:a16="http://schemas.microsoft.com/office/drawing/2014/main" val="2196600346"/>
+                  </a:ext>
+                </a:extLst>
+              </a:tr>
+              <a:tr h="0">
+                <a:tc>
+                  <a:txBody>
+                    <a:bodyPr/>
+                    <a:lstStyle/>
+                    <a:p>
+                      <a:endParaRPr lang="en-US" sz="100"/>
+                    </a:p>
+                  </a:txBody>
+                  <a:tcPr/>
+                </a:tc>
+                <a:tc>
+                  <a:txBody>
+                    <a:bodyPr/>
+                    <a:lstStyle/>
+                    <a:p>
+                      <a:endParaRPr lang="en-US" sz="100"/>
+                    </a:p>
+                  </a:txBody>
+                  <a:tcPr/>
+                </a:tc>
+                <a:tc>
+                  <a:txBody>
+                    <a:bodyPr/>
+                    <a:lstStyle/>
+                    <a:p>
+                      <a:endParaRPr lang="en-US" sz="100"/>
+                    </a:p>
+                  </a:txBody>
+                  <a:tcPr/>
+                </a:tc>
+                <a:tc>
+                  <a:txBody>
+                    <a:bodyPr/>
+                    <a:lstStyle/>
+                    <a:p>
+                      <a:endParaRPr lang="en-US" sz="100"/>
+                    </a:p>
+                  </a:txBody>
+                  <a:tcPr/>
+                </a:tc>
+                <a:extLst>
+                  <a:ext uri="{0D108BD9-81ED-4DB2-BD59-A6C34878D82A}">
+                    <a16:rowId xmlns:a16="http://schemas.microsoft.com/office/drawing/2014/main" val="1182745223"/>
+                  </a:ext>
+                </a:extLst>
+              </a:tr>
+              <a:tr h="0">
+                <a:tc>
+                  <a:txBody>
+                    <a:bodyPr/>
+                    <a:lstStyle/>
+                    <a:p>
+                      <a:endParaRPr lang="en-US" sz="100"/>
+                    </a:p>
+                  </a:txBody>
+                  <a:tcPr/>
+                </a:tc>
+                <a:tc>
+                  <a:txBody>
+                    <a:bodyPr/>
+                    <a:lstStyle/>
+                    <a:p>
+                      <a:endParaRPr lang="en-US" sz="100"/>
+                    </a:p>
+                  </a:txBody>
+                  <a:tcPr/>
+                </a:tc>
+                <a:tc>
+                  <a:txBody>
+                    <a:bodyPr/>
+                    <a:lstStyle/>
+                    <a:p>
+                      <a:endParaRPr lang="en-US" sz="100"/>
+                    </a:p>
+                  </a:txBody>
+                  <a:tcPr/>
+                </a:tc>
+                <a:tc>
+                  <a:txBody>
+                    <a:bodyPr/>
+                    <a:lstStyle/>
+                    <a:p>
+                      <a:endParaRPr lang="en-US" sz="100"/>
+                    </a:p>
+                  </a:txBody>
+                  <a:tcPr/>
+                </a:tc>
+                <a:extLst>
+                  <a:ext uri="{0D108BD9-81ED-4DB2-BD59-A6C34878D82A}">
+                    <a16:rowId xmlns:a16="http://schemas.microsoft.com/office/drawing/2014/main" val="1211249238"/>
+                  </a:ext>
+                </a:extLst>
+              </a:tr>
+              <a:tr h="0">
+                <a:tc>
+                  <a:txBody>
+                    <a:bodyPr/>
+                    <a:lstStyle/>
+                    <a:p>
+                      <a:endParaRPr lang="en-US" sz="100"/>
+                    </a:p>
+                  </a:txBody>
+                  <a:tcPr/>
+                </a:tc>
+                <a:tc>
+                  <a:txBody>
+                    <a:bodyPr/>
+                    <a:lstStyle/>
+                    <a:p>
+                      <a:endParaRPr lang="en-US" sz="100"/>
+                    </a:p>
+                  </a:txBody>
+                  <a:tcPr/>
+                </a:tc>
+                <a:tc>
+                  <a:txBody>
+                    <a:bodyPr/>
+                    <a:lstStyle/>
+                    <a:p>
+                      <a:endParaRPr lang="en-US" sz="100"/>
+                    </a:p>
+                  </a:txBody>
+                  <a:tcPr/>
+                </a:tc>
+                <a:tc>
+                  <a:txBody>
+                    <a:bodyPr/>
+                    <a:lstStyle/>
+                    <a:p>
+                      <a:endParaRPr lang="en-US" sz="100"/>
+                    </a:p>
+                  </a:txBody>
+                  <a:tcPr/>
+                </a:tc>
+                <a:extLst>
+                  <a:ext uri="{0D108BD9-81ED-4DB2-BD59-A6C34878D82A}">
+                    <a16:rowId xmlns:a16="http://schemas.microsoft.com/office/drawing/2014/main" val="640380758"/>
+                  </a:ext>
+                </a:extLst>
+              </a:tr>
+              <a:tr h="0">
+                <a:tc>
+                  <a:txBody>
+                    <a:bodyPr/>
+                    <a:lstStyle/>
+                    <a:p>
+                      <a:endParaRPr lang="en-US" sz="100"/>
+                    </a:p>
+                  </a:txBody>
+                  <a:tcPr/>
+                </a:tc>
+                <a:tc>
+                  <a:txBody>
+                    <a:bodyPr/>
+                    <a:lstStyle/>
+                    <a:p>
+                      <a:endParaRPr lang="en-US" sz="100"/>
+                    </a:p>
+                  </a:txBody>
+                  <a:tcPr/>
+                </a:tc>
+                <a:tc>
+                  <a:txBody>
+                    <a:bodyPr/>
+                    <a:lstStyle/>
+                    <a:p>
+                      <a:endParaRPr lang="en-US" sz="100"/>
+                    </a:p>
+                  </a:txBody>
+                  <a:tcPr/>
+                </a:tc>
+                <a:tc>
+                  <a:txBody>
+                    <a:bodyPr/>
+                    <a:lstStyle/>
+                    <a:p>
+                      <a:endParaRPr lang="en-US" sz="100"/>
+                    </a:p>
+                  </a:txBody>
+                  <a:tcPr/>
+                </a:tc>
+                <a:extLst>
+                  <a:ext uri="{0D108BD9-81ED-4DB2-BD59-A6C34878D82A}">
+                    <a16:rowId xmlns:a16="http://schemas.microsoft.com/office/drawing/2014/main" val="3739254808"/>
+                  </a:ext>
+                </a:extLst>
+              </a:tr>
+              <a:tr h="0">
+                <a:tc>
+                  <a:txBody>
+                    <a:bodyPr/>
+                    <a:lstStyle/>
+                    <a:p>
+                      <a:endParaRPr lang="en-US" sz="100"/>
+                    </a:p>
+                  </a:txBody>
+                  <a:tcPr/>
+                </a:tc>
+                <a:tc>
+                  <a:txBody>
+                    <a:bodyPr/>
+                    <a:lstStyle/>
+                    <a:p>
+                      <a:endParaRPr lang="en-US" sz="100"/>
+                    </a:p>
+                  </a:txBody>
+                  <a:tcPr/>
+                </a:tc>
+                <a:tc>
+                  <a:txBody>
+                    <a:bodyPr/>
+                    <a:lstStyle/>
+                    <a:p>
+                      <a:endParaRPr lang="en-US" sz="100"/>
+                    </a:p>
+                  </a:txBody>
+                  <a:tcPr/>
+                </a:tc>
+                <a:tc>
+                  <a:txBody>
+                    <a:bodyPr/>
+                    <a:lstStyle/>
+                    <a:p>
+                      <a:endParaRPr lang="en-US" sz="100"/>
+                    </a:p>
+                  </a:txBody>
+                  <a:tcPr/>
+                </a:tc>
+                <a:extLst>
+                  <a:ext uri="{0D108BD9-81ED-4DB2-BD59-A6C34878D82A}">
+                    <a16:rowId xmlns:a16="http://schemas.microsoft.com/office/drawing/2014/main" val="2733300335"/>
+                  </a:ext>
+                </a:extLst>
+              </a:tr>
+              <a:tr h="0">
+                <a:tc>
+                  <a:txBody>
+                    <a:bodyPr/>
+                    <a:lstStyle/>
+                    <a:p>
+                      <a:endParaRPr lang="en-US" sz="100"/>
+                    </a:p>
+                  </a:txBody>
+                  <a:tcPr/>
+                </a:tc>
+                <a:tc>
+                  <a:txBody>
+                    <a:bodyPr/>
+                    <a:lstStyle/>
+                    <a:p>
+                      <a:endParaRPr lang="en-US" sz="100"/>
+                    </a:p>
+                  </a:txBody>
+                  <a:tcPr/>
+                </a:tc>
+                <a:tc>
+                  <a:txBody>
+                    <a:bodyPr/>
+                    <a:lstStyle/>
+                    <a:p>
+                      <a:endParaRPr lang="en-US" sz="100"/>
+                    </a:p>
+                  </a:txBody>
+                  <a:tcPr/>
+                </a:tc>
+                <a:tc>
+                  <a:txBody>
+                    <a:bodyPr/>
+                    <a:lstStyle/>
+                    <a:p>
+                      <a:endParaRPr lang="en-US" sz="100" dirty="0"/>
+                    </a:p>
+                  </a:txBody>
+                  <a:tcPr/>
+                </a:tc>
+                <a:extLst>
+                  <a:ext uri="{0D108BD9-81ED-4DB2-BD59-A6C34878D82A}">
+                    <a16:rowId xmlns:a16="http://schemas.microsoft.com/office/drawing/2014/main" val="4233758861"/>
+                  </a:ext>
+                </a:extLst>
+              </a:tr>
+            </a:tbl>
+          </a:graphicData>
+        </a:graphic>
+      </p:graphicFrame>
+      <p:graphicFrame>
+        <p:nvGraphicFramePr>
+          <p:cNvPr id="19" name="Table 18">
+            <a:extLst>
+              <a:ext uri="{FF2B5EF4-FFF2-40B4-BE49-F238E27FC236}">
+                <a16:creationId xmlns:a16="http://schemas.microsoft.com/office/drawing/2014/main" id="{BF594696-5046-6C4C-AAB5-1064F0A34348}"/>
+              </a:ext>
+            </a:extLst>
+          </p:cNvPr>
+          <p:cNvGraphicFramePr>
+            <a:graphicFrameLocks noGrp="1"/>
+          </p:cNvGraphicFramePr>
+          <p:nvPr>
+            <p:extLst>
+              <p:ext uri="{D42A27DB-BD31-4B8C-83A1-F6EECF244321}">
+                <p14:modId xmlns:p14="http://schemas.microsoft.com/office/powerpoint/2010/main" val="3308482686"/>
+              </p:ext>
+            </p:extLst>
+          </p:nvPr>
+        </p:nvGraphicFramePr>
+        <p:xfrm>
+          <a:off x="5867400" y="1219200"/>
+          <a:ext cx="833120" cy="817880"/>
+        </p:xfrm>
+        <a:graphic>
+          <a:graphicData uri="http://schemas.openxmlformats.org/drawingml/2006/table">
+            <a:tbl>
+              <a:tblPr firstRow="1" bandRow="1">
+                <a:tableStyleId>{5C22544A-7EE6-4342-B048-85BDC9FD1C3A}</a:tableStyleId>
+              </a:tblPr>
+              <a:tblGrid>
+                <a:gridCol w="208280">
+                  <a:extLst>
+                    <a:ext uri="{9D8B030D-6E8A-4147-A177-3AD203B41FA5}">
+                      <a16:colId xmlns:a16="http://schemas.microsoft.com/office/drawing/2014/main" val="2850824769"/>
+                    </a:ext>
+                  </a:extLst>
+                </a:gridCol>
+                <a:gridCol w="208280">
+                  <a:extLst>
+                    <a:ext uri="{9D8B030D-6E8A-4147-A177-3AD203B41FA5}">
+                      <a16:colId xmlns:a16="http://schemas.microsoft.com/office/drawing/2014/main" val="57343624"/>
+                    </a:ext>
+                  </a:extLst>
+                </a:gridCol>
+                <a:gridCol w="208280">
+                  <a:extLst>
+                    <a:ext uri="{9D8B030D-6E8A-4147-A177-3AD203B41FA5}">
+                      <a16:colId xmlns:a16="http://schemas.microsoft.com/office/drawing/2014/main" val="2298198695"/>
+                    </a:ext>
+                  </a:extLst>
+                </a:gridCol>
+                <a:gridCol w="208280">
+                  <a:extLst>
+                    <a:ext uri="{9D8B030D-6E8A-4147-A177-3AD203B41FA5}">
+                      <a16:colId xmlns:a16="http://schemas.microsoft.com/office/drawing/2014/main" val="3269445081"/>
+                    </a:ext>
+                  </a:extLst>
+                </a:gridCol>
+              </a:tblGrid>
+              <a:tr h="0">
+                <a:tc>
+                  <a:txBody>
+                    <a:bodyPr/>
+                    <a:lstStyle/>
+                    <a:p>
+                      <a:endParaRPr lang="en-US" sz="100" dirty="0"/>
+                    </a:p>
+                  </a:txBody>
+                  <a:tcPr/>
+                </a:tc>
+                <a:tc>
+                  <a:txBody>
+                    <a:bodyPr/>
+                    <a:lstStyle/>
+                    <a:p>
+                      <a:endParaRPr lang="en-US" sz="100"/>
+                    </a:p>
+                  </a:txBody>
+                  <a:tcPr/>
+                </a:tc>
+                <a:tc>
+                  <a:txBody>
+                    <a:bodyPr/>
+                    <a:lstStyle/>
+                    <a:p>
+                      <a:endParaRPr lang="en-US" sz="100"/>
+                    </a:p>
+                  </a:txBody>
+                  <a:tcPr/>
+                </a:tc>
+                <a:tc>
+                  <a:txBody>
+                    <a:bodyPr/>
+                    <a:lstStyle/>
+                    <a:p>
+                      <a:endParaRPr lang="en-US" sz="100"/>
+                    </a:p>
+                  </a:txBody>
+                  <a:tcPr/>
+                </a:tc>
+                <a:extLst>
+                  <a:ext uri="{0D108BD9-81ED-4DB2-BD59-A6C34878D82A}">
+                    <a16:rowId xmlns:a16="http://schemas.microsoft.com/office/drawing/2014/main" val="2196600346"/>
+                  </a:ext>
+                </a:extLst>
+              </a:tr>
+              <a:tr h="0">
+                <a:tc>
+                  <a:txBody>
+                    <a:bodyPr/>
+                    <a:lstStyle/>
+                    <a:p>
+                      <a:endParaRPr lang="en-US" sz="100" dirty="0">
+                        <a:solidFill>
+                          <a:srgbClr val="002060"/>
+                        </a:solidFill>
+                        <a:highlight>
+                          <a:srgbClr val="0000FF"/>
+                        </a:highlight>
+                      </a:endParaRPr>
+                    </a:p>
+                  </a:txBody>
+                  <a:tcPr>
+                    <a:solidFill>
+                      <a:srgbClr val="002060"/>
+                    </a:solidFill>
+                  </a:tcPr>
+                </a:tc>
+                <a:tc>
+                  <a:txBody>
+                    <a:bodyPr/>
+                    <a:lstStyle/>
+                    <a:p>
+                      <a:endParaRPr lang="en-US" sz="100" dirty="0">
+                        <a:solidFill>
+                          <a:srgbClr val="002060"/>
+                        </a:solidFill>
+                        <a:highlight>
+                          <a:srgbClr val="0000FF"/>
+                        </a:highlight>
+                      </a:endParaRPr>
+                    </a:p>
+                  </a:txBody>
+                  <a:tcPr>
+                    <a:solidFill>
+                      <a:srgbClr val="002060"/>
+                    </a:solidFill>
+                  </a:tcPr>
+                </a:tc>
+                <a:tc>
+                  <a:txBody>
+                    <a:bodyPr/>
+                    <a:lstStyle/>
+                    <a:p>
+                      <a:endParaRPr lang="en-US" sz="100" dirty="0">
+                        <a:solidFill>
+                          <a:srgbClr val="002060"/>
+                        </a:solidFill>
+                        <a:highlight>
+                          <a:srgbClr val="0000FF"/>
+                        </a:highlight>
+                      </a:endParaRPr>
+                    </a:p>
+                  </a:txBody>
+                  <a:tcPr>
+                    <a:solidFill>
+                      <a:srgbClr val="002060"/>
+                    </a:solidFill>
+                  </a:tcPr>
+                </a:tc>
+                <a:tc>
+                  <a:txBody>
+                    <a:bodyPr/>
+                    <a:lstStyle/>
+                    <a:p>
+                      <a:endParaRPr lang="en-US" sz="100" dirty="0">
+                        <a:solidFill>
+                          <a:srgbClr val="002060"/>
+                        </a:solidFill>
+                        <a:highlight>
+                          <a:srgbClr val="0000FF"/>
+                        </a:highlight>
+                      </a:endParaRPr>
+                    </a:p>
+                  </a:txBody>
+                  <a:tcPr>
+                    <a:solidFill>
+                      <a:srgbClr val="002060"/>
+                    </a:solidFill>
+                  </a:tcPr>
+                </a:tc>
+                <a:extLst>
+                  <a:ext uri="{0D108BD9-81ED-4DB2-BD59-A6C34878D82A}">
+                    <a16:rowId xmlns:a16="http://schemas.microsoft.com/office/drawing/2014/main" val="1182745223"/>
+                  </a:ext>
+                </a:extLst>
+              </a:tr>
+              <a:tr h="0">
+                <a:tc>
+                  <a:txBody>
+                    <a:bodyPr/>
+                    <a:lstStyle/>
+                    <a:p>
+                      <a:endParaRPr lang="en-US" sz="100">
+                        <a:solidFill>
+                          <a:srgbClr val="002060"/>
+                        </a:solidFill>
+                        <a:highlight>
+                          <a:srgbClr val="0000FF"/>
+                        </a:highlight>
+                      </a:endParaRPr>
+                    </a:p>
+                  </a:txBody>
+                  <a:tcPr>
+                    <a:solidFill>
+                      <a:srgbClr val="002060"/>
+                    </a:solidFill>
+                  </a:tcPr>
+                </a:tc>
+                <a:tc>
+                  <a:txBody>
+                    <a:bodyPr/>
+                    <a:lstStyle/>
+                    <a:p>
+                      <a:endParaRPr lang="en-US" sz="100">
+                        <a:solidFill>
+                          <a:srgbClr val="002060"/>
+                        </a:solidFill>
+                        <a:highlight>
+                          <a:srgbClr val="0000FF"/>
+                        </a:highlight>
+                      </a:endParaRPr>
+                    </a:p>
+                  </a:txBody>
+                  <a:tcPr>
+                    <a:solidFill>
+                      <a:srgbClr val="002060"/>
+                    </a:solidFill>
+                  </a:tcPr>
+                </a:tc>
+                <a:tc>
+                  <a:txBody>
+                    <a:bodyPr/>
+                    <a:lstStyle/>
+                    <a:p>
+                      <a:endParaRPr lang="en-US" sz="100" dirty="0">
+                        <a:solidFill>
+                          <a:srgbClr val="002060"/>
+                        </a:solidFill>
+                        <a:highlight>
+                          <a:srgbClr val="0000FF"/>
+                        </a:highlight>
+                      </a:endParaRPr>
+                    </a:p>
+                  </a:txBody>
+                  <a:tcPr>
+                    <a:solidFill>
+                      <a:srgbClr val="002060"/>
+                    </a:solidFill>
+                  </a:tcPr>
+                </a:tc>
+                <a:tc>
+                  <a:txBody>
+                    <a:bodyPr/>
+                    <a:lstStyle/>
+                    <a:p>
+                      <a:endParaRPr lang="en-US" sz="100" dirty="0">
+                        <a:solidFill>
+                          <a:srgbClr val="002060"/>
+                        </a:solidFill>
+                        <a:highlight>
+                          <a:srgbClr val="0000FF"/>
+                        </a:highlight>
+                      </a:endParaRPr>
+                    </a:p>
+                  </a:txBody>
+                  <a:tcPr>
+                    <a:solidFill>
+                      <a:srgbClr val="002060"/>
+                    </a:solidFill>
+                  </a:tcPr>
+                </a:tc>
+                <a:extLst>
+                  <a:ext uri="{0D108BD9-81ED-4DB2-BD59-A6C34878D82A}">
+                    <a16:rowId xmlns:a16="http://schemas.microsoft.com/office/drawing/2014/main" val="1211249238"/>
+                  </a:ext>
+                </a:extLst>
+              </a:tr>
+              <a:tr h="0">
+                <a:tc>
+                  <a:txBody>
+                    <a:bodyPr/>
+                    <a:lstStyle/>
+                    <a:p>
+                      <a:endParaRPr lang="en-US" sz="100" dirty="0"/>
+                    </a:p>
+                  </a:txBody>
+                  <a:tcPr>
+                    <a:solidFill>
+                      <a:srgbClr val="002060"/>
+                    </a:solidFill>
+                  </a:tcPr>
+                </a:tc>
+                <a:tc>
+                  <a:txBody>
+                    <a:bodyPr/>
+                    <a:lstStyle/>
+                    <a:p>
+                      <a:endParaRPr lang="en-US" sz="100" dirty="0"/>
+                    </a:p>
+                  </a:txBody>
+                  <a:tcPr>
+                    <a:solidFill>
+                      <a:srgbClr val="002060"/>
+                    </a:solidFill>
+                  </a:tcPr>
+                </a:tc>
+                <a:tc>
+                  <a:txBody>
+                    <a:bodyPr/>
+                    <a:lstStyle/>
+                    <a:p>
+                      <a:endParaRPr lang="en-US" sz="100" dirty="0"/>
+                    </a:p>
+                  </a:txBody>
+                  <a:tcPr>
+                    <a:solidFill>
+                      <a:srgbClr val="002060"/>
+                    </a:solidFill>
+                  </a:tcPr>
+                </a:tc>
+                <a:tc>
+                  <a:txBody>
+                    <a:bodyPr/>
+                    <a:lstStyle/>
+                    <a:p>
+                      <a:endParaRPr lang="en-US" sz="100" dirty="0"/>
+                    </a:p>
+                  </a:txBody>
+                  <a:tcPr>
+                    <a:solidFill>
+                      <a:srgbClr val="002060"/>
+                    </a:solidFill>
+                  </a:tcPr>
+                </a:tc>
+                <a:extLst>
+                  <a:ext uri="{0D108BD9-81ED-4DB2-BD59-A6C34878D82A}">
+                    <a16:rowId xmlns:a16="http://schemas.microsoft.com/office/drawing/2014/main" val="640380758"/>
+                  </a:ext>
+                </a:extLst>
+              </a:tr>
+              <a:tr h="0">
+                <a:tc>
+                  <a:txBody>
+                    <a:bodyPr/>
+                    <a:lstStyle/>
+                    <a:p>
+                      <a:endParaRPr lang="en-US" sz="100" dirty="0"/>
+                    </a:p>
+                  </a:txBody>
+                  <a:tcPr>
+                    <a:solidFill>
+                      <a:srgbClr val="C00000"/>
+                    </a:solidFill>
+                  </a:tcPr>
+                </a:tc>
+                <a:tc>
+                  <a:txBody>
+                    <a:bodyPr/>
+                    <a:lstStyle/>
+                    <a:p>
+                      <a:endParaRPr lang="en-US" sz="100" dirty="0"/>
+                    </a:p>
+                  </a:txBody>
+                  <a:tcPr>
+                    <a:solidFill>
+                      <a:srgbClr val="C00000"/>
+                    </a:solidFill>
+                  </a:tcPr>
+                </a:tc>
+                <a:tc>
+                  <a:txBody>
+                    <a:bodyPr/>
+                    <a:lstStyle/>
+                    <a:p>
+                      <a:endParaRPr lang="en-US" sz="100" dirty="0"/>
+                    </a:p>
+                  </a:txBody>
+                  <a:tcPr>
+                    <a:solidFill>
+                      <a:srgbClr val="C00000"/>
+                    </a:solidFill>
+                  </a:tcPr>
+                </a:tc>
+                <a:tc>
+                  <a:txBody>
+                    <a:bodyPr/>
+                    <a:lstStyle/>
+                    <a:p>
+                      <a:endParaRPr lang="en-US" sz="100" dirty="0"/>
+                    </a:p>
+                  </a:txBody>
+                  <a:tcPr>
+                    <a:solidFill>
+                      <a:srgbClr val="C00000"/>
+                    </a:solidFill>
+                  </a:tcPr>
+                </a:tc>
+                <a:extLst>
+                  <a:ext uri="{0D108BD9-81ED-4DB2-BD59-A6C34878D82A}">
+                    <a16:rowId xmlns:a16="http://schemas.microsoft.com/office/drawing/2014/main" val="3739254808"/>
+                  </a:ext>
+                </a:extLst>
+              </a:tr>
+              <a:tr h="0">
+                <a:tc>
+                  <a:txBody>
+                    <a:bodyPr/>
+                    <a:lstStyle/>
+                    <a:p>
+                      <a:endParaRPr lang="en-US" sz="100" dirty="0"/>
+                    </a:p>
+                  </a:txBody>
+                  <a:tcPr>
+                    <a:solidFill>
+                      <a:srgbClr val="C00000"/>
+                    </a:solidFill>
+                  </a:tcPr>
+                </a:tc>
+                <a:tc>
+                  <a:txBody>
+                    <a:bodyPr/>
+                    <a:lstStyle/>
+                    <a:p>
+                      <a:endParaRPr lang="en-US" sz="100"/>
+                    </a:p>
+                  </a:txBody>
+                  <a:tcPr>
+                    <a:solidFill>
+                      <a:srgbClr val="C00000"/>
+                    </a:solidFill>
+                  </a:tcPr>
+                </a:tc>
+                <a:tc>
+                  <a:txBody>
+                    <a:bodyPr/>
+                    <a:lstStyle/>
+                    <a:p>
+                      <a:endParaRPr lang="en-US" sz="100" dirty="0"/>
+                    </a:p>
+                  </a:txBody>
+                  <a:tcPr>
+                    <a:solidFill>
+                      <a:srgbClr val="C00000"/>
+                    </a:solidFill>
+                  </a:tcPr>
+                </a:tc>
+                <a:tc>
+                  <a:txBody>
+                    <a:bodyPr/>
+                    <a:lstStyle/>
+                    <a:p>
+                      <a:endParaRPr lang="en-US" sz="100" dirty="0"/>
+                    </a:p>
+                  </a:txBody>
+                  <a:tcPr>
+                    <a:solidFill>
+                      <a:srgbClr val="C00000"/>
+                    </a:solidFill>
+                  </a:tcPr>
+                </a:tc>
+                <a:extLst>
+                  <a:ext uri="{0D108BD9-81ED-4DB2-BD59-A6C34878D82A}">
+                    <a16:rowId xmlns:a16="http://schemas.microsoft.com/office/drawing/2014/main" val="2733300335"/>
+                  </a:ext>
+                </a:extLst>
+              </a:tr>
+              <a:tr h="0">
+                <a:tc>
+                  <a:txBody>
+                    <a:bodyPr/>
+                    <a:lstStyle/>
+                    <a:p>
+                      <a:endParaRPr lang="en-US" sz="100"/>
+                    </a:p>
+                  </a:txBody>
+                  <a:tcPr>
+                    <a:solidFill>
+                      <a:srgbClr val="C00000"/>
+                    </a:solidFill>
+                  </a:tcPr>
+                </a:tc>
+                <a:tc>
+                  <a:txBody>
+                    <a:bodyPr/>
+                    <a:lstStyle/>
+                    <a:p>
+                      <a:endParaRPr lang="en-US" sz="100"/>
+                    </a:p>
+                  </a:txBody>
+                  <a:tcPr>
+                    <a:solidFill>
+                      <a:srgbClr val="C00000"/>
+                    </a:solidFill>
+                  </a:tcPr>
+                </a:tc>
+                <a:tc>
+                  <a:txBody>
+                    <a:bodyPr/>
+                    <a:lstStyle/>
+                    <a:p>
+                      <a:endParaRPr lang="en-US" sz="100"/>
+                    </a:p>
+                  </a:txBody>
+                  <a:tcPr>
+                    <a:solidFill>
+                      <a:srgbClr val="C00000"/>
+                    </a:solidFill>
+                  </a:tcPr>
+                </a:tc>
+                <a:tc>
+                  <a:txBody>
+                    <a:bodyPr/>
+                    <a:lstStyle/>
+                    <a:p>
+                      <a:endParaRPr lang="en-US" sz="100" dirty="0"/>
+                    </a:p>
+                  </a:txBody>
+                  <a:tcPr>
+                    <a:solidFill>
+                      <a:srgbClr val="C00000"/>
+                    </a:solidFill>
+                  </a:tcPr>
+                </a:tc>
+                <a:extLst>
+                  <a:ext uri="{0D108BD9-81ED-4DB2-BD59-A6C34878D82A}">
+                    <a16:rowId xmlns:a16="http://schemas.microsoft.com/office/drawing/2014/main" val="4233758861"/>
+                  </a:ext>
+                </a:extLst>
+              </a:tr>
+            </a:tbl>
+          </a:graphicData>
+        </a:graphic>
+      </p:graphicFrame>
+      <p:graphicFrame>
+        <p:nvGraphicFramePr>
+          <p:cNvPr id="20" name="Table 19">
+            <a:extLst>
+              <a:ext uri="{FF2B5EF4-FFF2-40B4-BE49-F238E27FC236}">
+                <a16:creationId xmlns:a16="http://schemas.microsoft.com/office/drawing/2014/main" id="{D28BFC37-5092-994F-BE9C-5746EAC01F62}"/>
+              </a:ext>
+            </a:extLst>
+          </p:cNvPr>
+          <p:cNvGraphicFramePr>
+            <a:graphicFrameLocks noGrp="1"/>
+          </p:cNvGraphicFramePr>
+          <p:nvPr>
+            <p:extLst>
+              <p:ext uri="{D42A27DB-BD31-4B8C-83A1-F6EECF244321}">
+                <p14:modId xmlns:p14="http://schemas.microsoft.com/office/powerpoint/2010/main" val="3340879174"/>
+              </p:ext>
+            </p:extLst>
+          </p:nvPr>
+        </p:nvGraphicFramePr>
+        <p:xfrm>
+          <a:off x="4724400" y="2677160"/>
+          <a:ext cx="833120" cy="467360"/>
+        </p:xfrm>
+        <a:graphic>
+          <a:graphicData uri="http://schemas.openxmlformats.org/drawingml/2006/table">
+            <a:tbl>
+              <a:tblPr firstRow="1" bandRow="1">
+                <a:tableStyleId>{5C22544A-7EE6-4342-B048-85BDC9FD1C3A}</a:tableStyleId>
+              </a:tblPr>
+              <a:tblGrid>
+                <a:gridCol w="208280">
+                  <a:extLst>
+                    <a:ext uri="{9D8B030D-6E8A-4147-A177-3AD203B41FA5}">
+                      <a16:colId xmlns:a16="http://schemas.microsoft.com/office/drawing/2014/main" val="2850824769"/>
+                    </a:ext>
+                  </a:extLst>
+                </a:gridCol>
+                <a:gridCol w="208280">
+                  <a:extLst>
+                    <a:ext uri="{9D8B030D-6E8A-4147-A177-3AD203B41FA5}">
+                      <a16:colId xmlns:a16="http://schemas.microsoft.com/office/drawing/2014/main" val="57343624"/>
+                    </a:ext>
+                  </a:extLst>
+                </a:gridCol>
+                <a:gridCol w="208280">
+                  <a:extLst>
+                    <a:ext uri="{9D8B030D-6E8A-4147-A177-3AD203B41FA5}">
+                      <a16:colId xmlns:a16="http://schemas.microsoft.com/office/drawing/2014/main" val="2298198695"/>
+                    </a:ext>
+                  </a:extLst>
+                </a:gridCol>
+                <a:gridCol w="208280">
+                  <a:extLst>
+                    <a:ext uri="{9D8B030D-6E8A-4147-A177-3AD203B41FA5}">
+                      <a16:colId xmlns:a16="http://schemas.microsoft.com/office/drawing/2014/main" val="3269445081"/>
+                    </a:ext>
+                  </a:extLst>
+                </a:gridCol>
+              </a:tblGrid>
+              <a:tr h="0">
+                <a:tc>
+                  <a:txBody>
+                    <a:bodyPr/>
+                    <a:lstStyle/>
+                    <a:p>
+                      <a:endParaRPr lang="en-US" sz="100" dirty="0"/>
+                    </a:p>
+                  </a:txBody>
+                  <a:tcPr/>
+                </a:tc>
+                <a:tc>
+                  <a:txBody>
+                    <a:bodyPr/>
+                    <a:lstStyle/>
+                    <a:p>
+                      <a:endParaRPr lang="en-US" sz="100"/>
+                    </a:p>
+                  </a:txBody>
+                  <a:tcPr/>
+                </a:tc>
+                <a:tc>
+                  <a:txBody>
+                    <a:bodyPr/>
+                    <a:lstStyle/>
+                    <a:p>
+                      <a:endParaRPr lang="en-US" sz="100"/>
+                    </a:p>
+                  </a:txBody>
+                  <a:tcPr/>
+                </a:tc>
+                <a:tc>
+                  <a:txBody>
+                    <a:bodyPr/>
+                    <a:lstStyle/>
+                    <a:p>
+                      <a:endParaRPr lang="en-US" sz="100"/>
+                    </a:p>
+                  </a:txBody>
+                  <a:tcPr/>
+                </a:tc>
+                <a:extLst>
+                  <a:ext uri="{0D108BD9-81ED-4DB2-BD59-A6C34878D82A}">
+                    <a16:rowId xmlns:a16="http://schemas.microsoft.com/office/drawing/2014/main" val="2196600346"/>
+                  </a:ext>
+                </a:extLst>
+              </a:tr>
+              <a:tr h="0">
+                <a:tc>
+                  <a:txBody>
+                    <a:bodyPr/>
+                    <a:lstStyle/>
+                    <a:p>
+                      <a:endParaRPr lang="en-US" sz="100" dirty="0">
+                        <a:solidFill>
+                          <a:srgbClr val="002060"/>
+                        </a:solidFill>
+                        <a:highlight>
+                          <a:srgbClr val="0000FF"/>
+                        </a:highlight>
+                      </a:endParaRPr>
+                    </a:p>
+                  </a:txBody>
+                  <a:tcPr>
+                    <a:solidFill>
+                      <a:srgbClr val="002060"/>
+                    </a:solidFill>
+                  </a:tcPr>
+                </a:tc>
+                <a:tc>
+                  <a:txBody>
+                    <a:bodyPr/>
+                    <a:lstStyle/>
+                    <a:p>
+                      <a:endParaRPr lang="en-US" sz="100" dirty="0">
+                        <a:solidFill>
+                          <a:srgbClr val="002060"/>
+                        </a:solidFill>
+                        <a:highlight>
+                          <a:srgbClr val="0000FF"/>
+                        </a:highlight>
+                      </a:endParaRPr>
+                    </a:p>
+                  </a:txBody>
+                  <a:tcPr>
+                    <a:solidFill>
+                      <a:srgbClr val="002060"/>
+                    </a:solidFill>
+                  </a:tcPr>
+                </a:tc>
+                <a:tc>
+                  <a:txBody>
+                    <a:bodyPr/>
+                    <a:lstStyle/>
+                    <a:p>
+                      <a:endParaRPr lang="en-US" sz="100" dirty="0">
+                        <a:solidFill>
+                          <a:srgbClr val="002060"/>
+                        </a:solidFill>
+                        <a:highlight>
+                          <a:srgbClr val="0000FF"/>
+                        </a:highlight>
+                      </a:endParaRPr>
+                    </a:p>
+                  </a:txBody>
+                  <a:tcPr>
+                    <a:solidFill>
+                      <a:srgbClr val="002060"/>
+                    </a:solidFill>
+                  </a:tcPr>
+                </a:tc>
+                <a:tc>
+                  <a:txBody>
+                    <a:bodyPr/>
+                    <a:lstStyle/>
+                    <a:p>
+                      <a:endParaRPr lang="en-US" sz="100" dirty="0">
+                        <a:solidFill>
+                          <a:srgbClr val="002060"/>
+                        </a:solidFill>
+                        <a:highlight>
+                          <a:srgbClr val="0000FF"/>
+                        </a:highlight>
+                      </a:endParaRPr>
+                    </a:p>
+                  </a:txBody>
+                  <a:tcPr>
+                    <a:solidFill>
+                      <a:srgbClr val="002060"/>
+                    </a:solidFill>
+                  </a:tcPr>
+                </a:tc>
+                <a:extLst>
+                  <a:ext uri="{0D108BD9-81ED-4DB2-BD59-A6C34878D82A}">
+                    <a16:rowId xmlns:a16="http://schemas.microsoft.com/office/drawing/2014/main" val="1182745223"/>
+                  </a:ext>
+                </a:extLst>
+              </a:tr>
+              <a:tr h="0">
+                <a:tc>
+                  <a:txBody>
+                    <a:bodyPr/>
+                    <a:lstStyle/>
+                    <a:p>
+                      <a:endParaRPr lang="en-US" sz="100">
+                        <a:solidFill>
+                          <a:srgbClr val="002060"/>
+                        </a:solidFill>
+                        <a:highlight>
+                          <a:srgbClr val="0000FF"/>
+                        </a:highlight>
+                      </a:endParaRPr>
+                    </a:p>
+                  </a:txBody>
+                  <a:tcPr>
+                    <a:solidFill>
+                      <a:srgbClr val="002060"/>
+                    </a:solidFill>
+                  </a:tcPr>
+                </a:tc>
+                <a:tc>
+                  <a:txBody>
+                    <a:bodyPr/>
+                    <a:lstStyle/>
+                    <a:p>
+                      <a:endParaRPr lang="en-US" sz="100">
+                        <a:solidFill>
+                          <a:srgbClr val="002060"/>
+                        </a:solidFill>
+                        <a:highlight>
+                          <a:srgbClr val="0000FF"/>
+                        </a:highlight>
+                      </a:endParaRPr>
+                    </a:p>
+                  </a:txBody>
+                  <a:tcPr>
+                    <a:solidFill>
+                      <a:srgbClr val="002060"/>
+                    </a:solidFill>
+                  </a:tcPr>
+                </a:tc>
+                <a:tc>
+                  <a:txBody>
+                    <a:bodyPr/>
+                    <a:lstStyle/>
+                    <a:p>
+                      <a:endParaRPr lang="en-US" sz="100" dirty="0">
+                        <a:solidFill>
+                          <a:srgbClr val="002060"/>
+                        </a:solidFill>
+                        <a:highlight>
+                          <a:srgbClr val="0000FF"/>
+                        </a:highlight>
+                      </a:endParaRPr>
+                    </a:p>
+                  </a:txBody>
+                  <a:tcPr>
+                    <a:solidFill>
+                      <a:srgbClr val="002060"/>
+                    </a:solidFill>
+                  </a:tcPr>
+                </a:tc>
+                <a:tc>
+                  <a:txBody>
+                    <a:bodyPr/>
+                    <a:lstStyle/>
+                    <a:p>
+                      <a:endParaRPr lang="en-US" sz="100" dirty="0">
+                        <a:solidFill>
+                          <a:srgbClr val="002060"/>
+                        </a:solidFill>
+                        <a:highlight>
+                          <a:srgbClr val="0000FF"/>
+                        </a:highlight>
+                      </a:endParaRPr>
+                    </a:p>
+                  </a:txBody>
+                  <a:tcPr>
+                    <a:solidFill>
+                      <a:srgbClr val="002060"/>
+                    </a:solidFill>
+                  </a:tcPr>
+                </a:tc>
+                <a:extLst>
+                  <a:ext uri="{0D108BD9-81ED-4DB2-BD59-A6C34878D82A}">
+                    <a16:rowId xmlns:a16="http://schemas.microsoft.com/office/drawing/2014/main" val="1211249238"/>
+                  </a:ext>
+                </a:extLst>
+              </a:tr>
+              <a:tr h="0">
+                <a:tc>
+                  <a:txBody>
+                    <a:bodyPr/>
+                    <a:lstStyle/>
+                    <a:p>
+                      <a:endParaRPr lang="en-US" sz="100" dirty="0"/>
+                    </a:p>
+                  </a:txBody>
+                  <a:tcPr>
+                    <a:solidFill>
+                      <a:srgbClr val="002060"/>
+                    </a:solidFill>
+                  </a:tcPr>
+                </a:tc>
+                <a:tc>
+                  <a:txBody>
+                    <a:bodyPr/>
+                    <a:lstStyle/>
+                    <a:p>
+                      <a:endParaRPr lang="en-US" sz="100" dirty="0"/>
+                    </a:p>
+                  </a:txBody>
+                  <a:tcPr>
+                    <a:solidFill>
+                      <a:srgbClr val="002060"/>
+                    </a:solidFill>
+                  </a:tcPr>
+                </a:tc>
+                <a:tc>
+                  <a:txBody>
+                    <a:bodyPr/>
+                    <a:lstStyle/>
+                    <a:p>
+                      <a:endParaRPr lang="en-US" sz="100" dirty="0"/>
+                    </a:p>
+                  </a:txBody>
+                  <a:tcPr>
+                    <a:solidFill>
+                      <a:srgbClr val="002060"/>
+                    </a:solidFill>
+                  </a:tcPr>
+                </a:tc>
+                <a:tc>
+                  <a:txBody>
+                    <a:bodyPr/>
+                    <a:lstStyle/>
+                    <a:p>
+                      <a:endParaRPr lang="en-US" sz="100" dirty="0"/>
+                    </a:p>
+                  </a:txBody>
+                  <a:tcPr>
+                    <a:solidFill>
+                      <a:srgbClr val="002060"/>
+                    </a:solidFill>
+                  </a:tcPr>
+                </a:tc>
+                <a:extLst>
+                  <a:ext uri="{0D108BD9-81ED-4DB2-BD59-A6C34878D82A}">
+                    <a16:rowId xmlns:a16="http://schemas.microsoft.com/office/drawing/2014/main" val="640380758"/>
+                  </a:ext>
+                </a:extLst>
+              </a:tr>
+            </a:tbl>
+          </a:graphicData>
+        </a:graphic>
+      </p:graphicFrame>
+      <p:graphicFrame>
+        <p:nvGraphicFramePr>
+          <p:cNvPr id="22" name="Table 21">
+            <a:extLst>
+              <a:ext uri="{FF2B5EF4-FFF2-40B4-BE49-F238E27FC236}">
+                <a16:creationId xmlns:a16="http://schemas.microsoft.com/office/drawing/2014/main" id="{0037C4E1-C3F4-EA42-8688-6E3A933D0A95}"/>
+              </a:ext>
+            </a:extLst>
+          </p:cNvPr>
+          <p:cNvGraphicFramePr>
+            <a:graphicFrameLocks noGrp="1"/>
+          </p:cNvGraphicFramePr>
+          <p:nvPr>
+            <p:extLst>
+              <p:ext uri="{D42A27DB-BD31-4B8C-83A1-F6EECF244321}">
+                <p14:modId xmlns:p14="http://schemas.microsoft.com/office/powerpoint/2010/main" val="1684384551"/>
+              </p:ext>
+            </p:extLst>
+          </p:nvPr>
+        </p:nvGraphicFramePr>
+        <p:xfrm>
+          <a:off x="5715000" y="2677160"/>
+          <a:ext cx="833120" cy="467360"/>
+        </p:xfrm>
+        <a:graphic>
+          <a:graphicData uri="http://schemas.openxmlformats.org/drawingml/2006/table">
+            <a:tbl>
+              <a:tblPr firstRow="1" bandRow="1">
+                <a:tableStyleId>{5C22544A-7EE6-4342-B048-85BDC9FD1C3A}</a:tableStyleId>
+              </a:tblPr>
+              <a:tblGrid>
+                <a:gridCol w="208280">
+                  <a:extLst>
+                    <a:ext uri="{9D8B030D-6E8A-4147-A177-3AD203B41FA5}">
+                      <a16:colId xmlns:a16="http://schemas.microsoft.com/office/drawing/2014/main" val="2850824769"/>
+                    </a:ext>
+                  </a:extLst>
+                </a:gridCol>
+                <a:gridCol w="208280">
+                  <a:extLst>
+                    <a:ext uri="{9D8B030D-6E8A-4147-A177-3AD203B41FA5}">
+                      <a16:colId xmlns:a16="http://schemas.microsoft.com/office/drawing/2014/main" val="57343624"/>
+                    </a:ext>
+                  </a:extLst>
+                </a:gridCol>
+                <a:gridCol w="208280">
+                  <a:extLst>
+                    <a:ext uri="{9D8B030D-6E8A-4147-A177-3AD203B41FA5}">
+                      <a16:colId xmlns:a16="http://schemas.microsoft.com/office/drawing/2014/main" val="2298198695"/>
+                    </a:ext>
+                  </a:extLst>
+                </a:gridCol>
+                <a:gridCol w="208280">
+                  <a:extLst>
+                    <a:ext uri="{9D8B030D-6E8A-4147-A177-3AD203B41FA5}">
+                      <a16:colId xmlns:a16="http://schemas.microsoft.com/office/drawing/2014/main" val="3269445081"/>
+                    </a:ext>
+                  </a:extLst>
+                </a:gridCol>
+              </a:tblGrid>
+              <a:tr h="0">
+                <a:tc>
+                  <a:txBody>
+                    <a:bodyPr/>
+                    <a:lstStyle/>
+                    <a:p>
+                      <a:endParaRPr lang="en-US" sz="100" dirty="0"/>
+                    </a:p>
+                  </a:txBody>
+                  <a:tcPr/>
+                </a:tc>
+                <a:tc>
+                  <a:txBody>
+                    <a:bodyPr/>
+                    <a:lstStyle/>
+                    <a:p>
+                      <a:endParaRPr lang="en-US" sz="100"/>
+                    </a:p>
+                  </a:txBody>
+                  <a:tcPr/>
+                </a:tc>
+                <a:tc>
+                  <a:txBody>
+                    <a:bodyPr/>
+                    <a:lstStyle/>
+                    <a:p>
+                      <a:endParaRPr lang="en-US" sz="100"/>
+                    </a:p>
+                  </a:txBody>
+                  <a:tcPr/>
+                </a:tc>
+                <a:tc>
+                  <a:txBody>
+                    <a:bodyPr/>
+                    <a:lstStyle/>
+                    <a:p>
+                      <a:endParaRPr lang="en-US" sz="100"/>
+                    </a:p>
+                  </a:txBody>
+                  <a:tcPr/>
+                </a:tc>
+                <a:extLst>
+                  <a:ext uri="{0D108BD9-81ED-4DB2-BD59-A6C34878D82A}">
+                    <a16:rowId xmlns:a16="http://schemas.microsoft.com/office/drawing/2014/main" val="2196600346"/>
+                  </a:ext>
+                </a:extLst>
+              </a:tr>
+              <a:tr h="0">
+                <a:tc>
+                  <a:txBody>
+                    <a:bodyPr/>
+                    <a:lstStyle/>
+                    <a:p>
+                      <a:endParaRPr lang="en-US" sz="100" dirty="0">
+                        <a:solidFill>
+                          <a:srgbClr val="002060"/>
+                        </a:solidFill>
+                        <a:highlight>
+                          <a:srgbClr val="0000FF"/>
+                        </a:highlight>
+                      </a:endParaRPr>
+                    </a:p>
+                  </a:txBody>
+                  <a:tcPr>
+                    <a:solidFill>
+                      <a:srgbClr val="C00000"/>
+                    </a:solidFill>
+                  </a:tcPr>
+                </a:tc>
+                <a:tc>
+                  <a:txBody>
+                    <a:bodyPr/>
+                    <a:lstStyle/>
+                    <a:p>
+                      <a:endParaRPr lang="en-US" sz="100" dirty="0">
+                        <a:solidFill>
+                          <a:srgbClr val="002060"/>
+                        </a:solidFill>
+                        <a:highlight>
+                          <a:srgbClr val="0000FF"/>
+                        </a:highlight>
+                      </a:endParaRPr>
+                    </a:p>
+                  </a:txBody>
+                  <a:tcPr>
+                    <a:solidFill>
+                      <a:srgbClr val="C00000"/>
+                    </a:solidFill>
+                  </a:tcPr>
+                </a:tc>
+                <a:tc>
+                  <a:txBody>
+                    <a:bodyPr/>
+                    <a:lstStyle/>
+                    <a:p>
+                      <a:endParaRPr lang="en-US" sz="100" dirty="0">
+                        <a:solidFill>
+                          <a:srgbClr val="002060"/>
+                        </a:solidFill>
+                        <a:highlight>
+                          <a:srgbClr val="0000FF"/>
+                        </a:highlight>
+                      </a:endParaRPr>
+                    </a:p>
+                  </a:txBody>
+                  <a:tcPr>
+                    <a:solidFill>
+                      <a:srgbClr val="C00000"/>
+                    </a:solidFill>
+                  </a:tcPr>
+                </a:tc>
+                <a:tc>
+                  <a:txBody>
+                    <a:bodyPr/>
+                    <a:lstStyle/>
+                    <a:p>
+                      <a:endParaRPr lang="en-US" sz="100" dirty="0">
+                        <a:solidFill>
+                          <a:srgbClr val="002060"/>
+                        </a:solidFill>
+                        <a:highlight>
+                          <a:srgbClr val="0000FF"/>
+                        </a:highlight>
+                      </a:endParaRPr>
+                    </a:p>
+                  </a:txBody>
+                  <a:tcPr>
+                    <a:solidFill>
+                      <a:srgbClr val="C00000"/>
+                    </a:solidFill>
+                  </a:tcPr>
+                </a:tc>
+                <a:extLst>
+                  <a:ext uri="{0D108BD9-81ED-4DB2-BD59-A6C34878D82A}">
+                    <a16:rowId xmlns:a16="http://schemas.microsoft.com/office/drawing/2014/main" val="1182745223"/>
+                  </a:ext>
+                </a:extLst>
+              </a:tr>
+              <a:tr h="0">
+                <a:tc>
+                  <a:txBody>
+                    <a:bodyPr/>
+                    <a:lstStyle/>
+                    <a:p>
+                      <a:endParaRPr lang="en-US" sz="100" dirty="0">
+                        <a:solidFill>
+                          <a:srgbClr val="002060"/>
+                        </a:solidFill>
+                        <a:highlight>
+                          <a:srgbClr val="0000FF"/>
+                        </a:highlight>
+                      </a:endParaRPr>
+                    </a:p>
+                  </a:txBody>
+                  <a:tcPr>
+                    <a:solidFill>
+                      <a:srgbClr val="C00000"/>
+                    </a:solidFill>
+                  </a:tcPr>
+                </a:tc>
+                <a:tc>
+                  <a:txBody>
+                    <a:bodyPr/>
+                    <a:lstStyle/>
+                    <a:p>
+                      <a:endParaRPr lang="en-US" sz="100" dirty="0">
+                        <a:solidFill>
+                          <a:srgbClr val="002060"/>
+                        </a:solidFill>
+                        <a:highlight>
+                          <a:srgbClr val="0000FF"/>
+                        </a:highlight>
+                      </a:endParaRPr>
+                    </a:p>
+                  </a:txBody>
+                  <a:tcPr>
+                    <a:solidFill>
+                      <a:srgbClr val="C00000"/>
+                    </a:solidFill>
+                  </a:tcPr>
+                </a:tc>
+                <a:tc>
+                  <a:txBody>
+                    <a:bodyPr/>
+                    <a:lstStyle/>
+                    <a:p>
+                      <a:endParaRPr lang="en-US" sz="100" dirty="0">
+                        <a:solidFill>
+                          <a:srgbClr val="002060"/>
+                        </a:solidFill>
+                        <a:highlight>
+                          <a:srgbClr val="0000FF"/>
+                        </a:highlight>
+                      </a:endParaRPr>
+                    </a:p>
+                  </a:txBody>
+                  <a:tcPr>
+                    <a:solidFill>
+                      <a:srgbClr val="C00000"/>
+                    </a:solidFill>
+                  </a:tcPr>
+                </a:tc>
+                <a:tc>
+                  <a:txBody>
+                    <a:bodyPr/>
+                    <a:lstStyle/>
+                    <a:p>
+                      <a:endParaRPr lang="en-US" sz="100" dirty="0">
+                        <a:solidFill>
+                          <a:srgbClr val="002060"/>
+                        </a:solidFill>
+                        <a:highlight>
+                          <a:srgbClr val="0000FF"/>
+                        </a:highlight>
+                      </a:endParaRPr>
+                    </a:p>
+                  </a:txBody>
+                  <a:tcPr>
+                    <a:solidFill>
+                      <a:srgbClr val="C00000"/>
+                    </a:solidFill>
+                  </a:tcPr>
+                </a:tc>
+                <a:extLst>
+                  <a:ext uri="{0D108BD9-81ED-4DB2-BD59-A6C34878D82A}">
+                    <a16:rowId xmlns:a16="http://schemas.microsoft.com/office/drawing/2014/main" val="1211249238"/>
+                  </a:ext>
+                </a:extLst>
+              </a:tr>
+              <a:tr h="0">
+                <a:tc>
+                  <a:txBody>
+                    <a:bodyPr/>
+                    <a:lstStyle/>
+                    <a:p>
+                      <a:endParaRPr lang="en-US" sz="100" dirty="0"/>
+                    </a:p>
+                  </a:txBody>
+                  <a:tcPr>
+                    <a:solidFill>
+                      <a:srgbClr val="C00000"/>
+                    </a:solidFill>
+                  </a:tcPr>
+                </a:tc>
+                <a:tc>
+                  <a:txBody>
+                    <a:bodyPr/>
+                    <a:lstStyle/>
+                    <a:p>
+                      <a:endParaRPr lang="en-US" sz="100" dirty="0"/>
+                    </a:p>
+                  </a:txBody>
+                  <a:tcPr>
+                    <a:solidFill>
+                      <a:srgbClr val="C00000"/>
+                    </a:solidFill>
+                  </a:tcPr>
+                </a:tc>
+                <a:tc>
+                  <a:txBody>
+                    <a:bodyPr/>
+                    <a:lstStyle/>
+                    <a:p>
+                      <a:endParaRPr lang="en-US" sz="100" dirty="0"/>
+                    </a:p>
+                  </a:txBody>
+                  <a:tcPr>
+                    <a:solidFill>
+                      <a:srgbClr val="C00000"/>
+                    </a:solidFill>
+                  </a:tcPr>
+                </a:tc>
+                <a:tc>
+                  <a:txBody>
+                    <a:bodyPr/>
+                    <a:lstStyle/>
+                    <a:p>
+                      <a:endParaRPr lang="en-US" sz="100" dirty="0"/>
+                    </a:p>
+                  </a:txBody>
+                  <a:tcPr>
+                    <a:solidFill>
+                      <a:srgbClr val="C00000"/>
+                    </a:solidFill>
+                  </a:tcPr>
+                </a:tc>
+                <a:extLst>
+                  <a:ext uri="{0D108BD9-81ED-4DB2-BD59-A6C34878D82A}">
+                    <a16:rowId xmlns:a16="http://schemas.microsoft.com/office/drawing/2014/main" val="640380758"/>
+                  </a:ext>
+                </a:extLst>
+              </a:tr>
+            </a:tbl>
+          </a:graphicData>
+        </a:graphic>
+      </p:graphicFrame>
+      <p:graphicFrame>
+        <p:nvGraphicFramePr>
+          <p:cNvPr id="23" name="Table 22">
+            <a:extLst>
+              <a:ext uri="{FF2B5EF4-FFF2-40B4-BE49-F238E27FC236}">
+                <a16:creationId xmlns:a16="http://schemas.microsoft.com/office/drawing/2014/main" id="{F0841CC1-4DC8-8949-9935-16A41B22A713}"/>
+              </a:ext>
+            </a:extLst>
+          </p:cNvPr>
+          <p:cNvGraphicFramePr>
+            <a:graphicFrameLocks noGrp="1"/>
+          </p:cNvGraphicFramePr>
+          <p:nvPr>
+            <p:extLst>
+              <p:ext uri="{D42A27DB-BD31-4B8C-83A1-F6EECF244321}">
+                <p14:modId xmlns:p14="http://schemas.microsoft.com/office/powerpoint/2010/main" val="3540486078"/>
+              </p:ext>
+            </p:extLst>
+          </p:nvPr>
+        </p:nvGraphicFramePr>
+        <p:xfrm>
+          <a:off x="8006080" y="2667000"/>
+          <a:ext cx="833120" cy="467360"/>
+        </p:xfrm>
+        <a:graphic>
+          <a:graphicData uri="http://schemas.openxmlformats.org/drawingml/2006/table">
+            <a:tbl>
+              <a:tblPr firstRow="1" bandRow="1">
+                <a:tableStyleId>{5C22544A-7EE6-4342-B048-85BDC9FD1C3A}</a:tableStyleId>
+              </a:tblPr>
+              <a:tblGrid>
+                <a:gridCol w="208280">
+                  <a:extLst>
+                    <a:ext uri="{9D8B030D-6E8A-4147-A177-3AD203B41FA5}">
+                      <a16:colId xmlns:a16="http://schemas.microsoft.com/office/drawing/2014/main" val="2850824769"/>
+                    </a:ext>
+                  </a:extLst>
+                </a:gridCol>
+                <a:gridCol w="208280">
+                  <a:extLst>
+                    <a:ext uri="{9D8B030D-6E8A-4147-A177-3AD203B41FA5}">
+                      <a16:colId xmlns:a16="http://schemas.microsoft.com/office/drawing/2014/main" val="57343624"/>
+                    </a:ext>
+                  </a:extLst>
+                </a:gridCol>
+                <a:gridCol w="208280">
+                  <a:extLst>
+                    <a:ext uri="{9D8B030D-6E8A-4147-A177-3AD203B41FA5}">
+                      <a16:colId xmlns:a16="http://schemas.microsoft.com/office/drawing/2014/main" val="2298198695"/>
+                    </a:ext>
+                  </a:extLst>
+                </a:gridCol>
+                <a:gridCol w="208280">
+                  <a:extLst>
+                    <a:ext uri="{9D8B030D-6E8A-4147-A177-3AD203B41FA5}">
+                      <a16:colId xmlns:a16="http://schemas.microsoft.com/office/drawing/2014/main" val="3269445081"/>
+                    </a:ext>
+                  </a:extLst>
+                </a:gridCol>
+              </a:tblGrid>
+              <a:tr h="0">
+                <a:tc>
+                  <a:txBody>
+                    <a:bodyPr/>
+                    <a:lstStyle/>
+                    <a:p>
+                      <a:endParaRPr lang="en-US" sz="100" dirty="0"/>
+                    </a:p>
+                  </a:txBody>
+                  <a:tcPr/>
+                </a:tc>
+                <a:tc>
+                  <a:txBody>
+                    <a:bodyPr/>
+                    <a:lstStyle/>
+                    <a:p>
+                      <a:endParaRPr lang="en-US" sz="100"/>
+                    </a:p>
+                  </a:txBody>
+                  <a:tcPr/>
+                </a:tc>
+                <a:tc>
+                  <a:txBody>
+                    <a:bodyPr/>
+                    <a:lstStyle/>
+                    <a:p>
+                      <a:endParaRPr lang="en-US" sz="100"/>
+                    </a:p>
+                  </a:txBody>
+                  <a:tcPr/>
+                </a:tc>
+                <a:tc>
+                  <a:txBody>
+                    <a:bodyPr/>
+                    <a:lstStyle/>
+                    <a:p>
+                      <a:endParaRPr lang="en-US" sz="100"/>
+                    </a:p>
+                  </a:txBody>
+                  <a:tcPr/>
+                </a:tc>
+                <a:extLst>
+                  <a:ext uri="{0D108BD9-81ED-4DB2-BD59-A6C34878D82A}">
+                    <a16:rowId xmlns:a16="http://schemas.microsoft.com/office/drawing/2014/main" val="2196600346"/>
+                  </a:ext>
+                </a:extLst>
+              </a:tr>
+              <a:tr h="0">
+                <a:tc>
+                  <a:txBody>
+                    <a:bodyPr/>
+                    <a:lstStyle/>
+                    <a:p>
+                      <a:endParaRPr lang="en-US" sz="100" dirty="0">
+                        <a:solidFill>
+                          <a:srgbClr val="002060"/>
+                        </a:solidFill>
+                        <a:highlight>
+                          <a:srgbClr val="0000FF"/>
+                        </a:highlight>
+                      </a:endParaRPr>
+                    </a:p>
+                  </a:txBody>
+                  <a:tcPr>
+                    <a:solidFill>
+                      <a:srgbClr val="002060"/>
+                    </a:solidFill>
+                  </a:tcPr>
+                </a:tc>
+                <a:tc>
+                  <a:txBody>
+                    <a:bodyPr/>
+                    <a:lstStyle/>
+                    <a:p>
+                      <a:endParaRPr lang="en-US" sz="100" dirty="0">
+                        <a:solidFill>
+                          <a:srgbClr val="002060"/>
+                        </a:solidFill>
+                        <a:highlight>
+                          <a:srgbClr val="0000FF"/>
+                        </a:highlight>
+                      </a:endParaRPr>
+                    </a:p>
+                  </a:txBody>
+                  <a:tcPr>
+                    <a:solidFill>
+                      <a:srgbClr val="002060"/>
+                    </a:solidFill>
+                  </a:tcPr>
+                </a:tc>
+                <a:tc>
+                  <a:txBody>
+                    <a:bodyPr/>
+                    <a:lstStyle/>
+                    <a:p>
+                      <a:endParaRPr lang="en-US" sz="100" dirty="0">
+                        <a:solidFill>
+                          <a:srgbClr val="002060"/>
+                        </a:solidFill>
+                        <a:highlight>
+                          <a:srgbClr val="0000FF"/>
+                        </a:highlight>
+                      </a:endParaRPr>
+                    </a:p>
+                  </a:txBody>
+                  <a:tcPr>
+                    <a:solidFill>
+                      <a:srgbClr val="002060"/>
+                    </a:solidFill>
+                  </a:tcPr>
+                </a:tc>
+                <a:tc>
+                  <a:txBody>
+                    <a:bodyPr/>
+                    <a:lstStyle/>
+                    <a:p>
+                      <a:endParaRPr lang="en-US" sz="100" dirty="0">
+                        <a:solidFill>
+                          <a:srgbClr val="002060"/>
+                        </a:solidFill>
+                        <a:highlight>
+                          <a:srgbClr val="0000FF"/>
+                        </a:highlight>
+                      </a:endParaRPr>
+                    </a:p>
+                  </a:txBody>
+                  <a:tcPr>
+                    <a:solidFill>
+                      <a:srgbClr val="002060"/>
+                    </a:solidFill>
+                  </a:tcPr>
+                </a:tc>
+                <a:extLst>
+                  <a:ext uri="{0D108BD9-81ED-4DB2-BD59-A6C34878D82A}">
+                    <a16:rowId xmlns:a16="http://schemas.microsoft.com/office/drawing/2014/main" val="1182745223"/>
+                  </a:ext>
+                </a:extLst>
+              </a:tr>
+              <a:tr h="0">
+                <a:tc>
+                  <a:txBody>
+                    <a:bodyPr/>
+                    <a:lstStyle/>
+                    <a:p>
+                      <a:endParaRPr lang="en-US" sz="100">
+                        <a:solidFill>
+                          <a:srgbClr val="002060"/>
+                        </a:solidFill>
+                        <a:highlight>
+                          <a:srgbClr val="0000FF"/>
+                        </a:highlight>
+                      </a:endParaRPr>
+                    </a:p>
+                  </a:txBody>
+                  <a:tcPr>
+                    <a:solidFill>
+                      <a:srgbClr val="002060"/>
+                    </a:solidFill>
+                  </a:tcPr>
+                </a:tc>
+                <a:tc>
+                  <a:txBody>
+                    <a:bodyPr/>
+                    <a:lstStyle/>
+                    <a:p>
+                      <a:endParaRPr lang="en-US" sz="100">
+                        <a:solidFill>
+                          <a:srgbClr val="002060"/>
+                        </a:solidFill>
+                        <a:highlight>
+                          <a:srgbClr val="0000FF"/>
+                        </a:highlight>
+                      </a:endParaRPr>
+                    </a:p>
+                  </a:txBody>
+                  <a:tcPr>
+                    <a:solidFill>
+                      <a:srgbClr val="002060"/>
+                    </a:solidFill>
+                  </a:tcPr>
+                </a:tc>
+                <a:tc>
+                  <a:txBody>
+                    <a:bodyPr/>
+                    <a:lstStyle/>
+                    <a:p>
+                      <a:endParaRPr lang="en-US" sz="100" dirty="0">
+                        <a:solidFill>
+                          <a:srgbClr val="002060"/>
+                        </a:solidFill>
+                        <a:highlight>
+                          <a:srgbClr val="0000FF"/>
+                        </a:highlight>
+                      </a:endParaRPr>
+                    </a:p>
+                  </a:txBody>
+                  <a:tcPr>
+                    <a:solidFill>
+                      <a:srgbClr val="002060"/>
+                    </a:solidFill>
+                  </a:tcPr>
+                </a:tc>
+                <a:tc>
+                  <a:txBody>
+                    <a:bodyPr/>
+                    <a:lstStyle/>
+                    <a:p>
+                      <a:endParaRPr lang="en-US" sz="100" dirty="0">
+                        <a:solidFill>
+                          <a:srgbClr val="002060"/>
+                        </a:solidFill>
+                        <a:highlight>
+                          <a:srgbClr val="0000FF"/>
+                        </a:highlight>
+                      </a:endParaRPr>
+                    </a:p>
+                  </a:txBody>
+                  <a:tcPr>
+                    <a:solidFill>
+                      <a:srgbClr val="002060"/>
+                    </a:solidFill>
+                  </a:tcPr>
+                </a:tc>
+                <a:extLst>
+                  <a:ext uri="{0D108BD9-81ED-4DB2-BD59-A6C34878D82A}">
+                    <a16:rowId xmlns:a16="http://schemas.microsoft.com/office/drawing/2014/main" val="1211249238"/>
+                  </a:ext>
+                </a:extLst>
+              </a:tr>
+              <a:tr h="0">
+                <a:tc>
+                  <a:txBody>
+                    <a:bodyPr/>
+                    <a:lstStyle/>
+                    <a:p>
+                      <a:endParaRPr lang="en-US" sz="100" dirty="0"/>
+                    </a:p>
+                  </a:txBody>
+                  <a:tcPr>
+                    <a:solidFill>
+                      <a:srgbClr val="002060"/>
+                    </a:solidFill>
+                  </a:tcPr>
+                </a:tc>
+                <a:tc>
+                  <a:txBody>
+                    <a:bodyPr/>
+                    <a:lstStyle/>
+                    <a:p>
+                      <a:endParaRPr lang="en-US" sz="100" dirty="0"/>
+                    </a:p>
+                  </a:txBody>
+                  <a:tcPr>
+                    <a:solidFill>
+                      <a:srgbClr val="002060"/>
+                    </a:solidFill>
+                  </a:tcPr>
+                </a:tc>
+                <a:tc>
+                  <a:txBody>
+                    <a:bodyPr/>
+                    <a:lstStyle/>
+                    <a:p>
+                      <a:endParaRPr lang="en-US" sz="100" dirty="0"/>
+                    </a:p>
+                  </a:txBody>
+                  <a:tcPr>
+                    <a:solidFill>
+                      <a:srgbClr val="002060"/>
+                    </a:solidFill>
+                  </a:tcPr>
+                </a:tc>
+                <a:tc>
+                  <a:txBody>
+                    <a:bodyPr/>
+                    <a:lstStyle/>
+                    <a:p>
+                      <a:endParaRPr lang="en-US" sz="100" dirty="0"/>
+                    </a:p>
+                  </a:txBody>
+                  <a:tcPr>
+                    <a:solidFill>
+                      <a:srgbClr val="002060"/>
+                    </a:solidFill>
+                  </a:tcPr>
+                </a:tc>
+                <a:extLst>
+                  <a:ext uri="{0D108BD9-81ED-4DB2-BD59-A6C34878D82A}">
+                    <a16:rowId xmlns:a16="http://schemas.microsoft.com/office/drawing/2014/main" val="640380758"/>
+                  </a:ext>
+                </a:extLst>
+              </a:tr>
+            </a:tbl>
+          </a:graphicData>
+        </a:graphic>
+      </p:graphicFrame>
+      <p:graphicFrame>
+        <p:nvGraphicFramePr>
+          <p:cNvPr id="24" name="Table 23">
+            <a:extLst>
+              <a:ext uri="{FF2B5EF4-FFF2-40B4-BE49-F238E27FC236}">
+                <a16:creationId xmlns:a16="http://schemas.microsoft.com/office/drawing/2014/main" id="{74DBE9BF-2790-4940-A7B3-17595199EBEA}"/>
+              </a:ext>
+            </a:extLst>
+          </p:cNvPr>
+          <p:cNvGraphicFramePr>
+            <a:graphicFrameLocks noGrp="1"/>
+          </p:cNvGraphicFramePr>
+          <p:nvPr>
+            <p:extLst>
+              <p:ext uri="{D42A27DB-BD31-4B8C-83A1-F6EECF244321}">
+                <p14:modId xmlns:p14="http://schemas.microsoft.com/office/powerpoint/2010/main" val="2831634155"/>
+              </p:ext>
+            </p:extLst>
+          </p:nvPr>
+        </p:nvGraphicFramePr>
+        <p:xfrm>
+          <a:off x="7010400" y="2667000"/>
+          <a:ext cx="833120" cy="467360"/>
+        </p:xfrm>
+        <a:graphic>
+          <a:graphicData uri="http://schemas.openxmlformats.org/drawingml/2006/table">
+            <a:tbl>
+              <a:tblPr firstRow="1" bandRow="1">
+                <a:tableStyleId>{5C22544A-7EE6-4342-B048-85BDC9FD1C3A}</a:tableStyleId>
+              </a:tblPr>
+              <a:tblGrid>
+                <a:gridCol w="208280">
+                  <a:extLst>
+                    <a:ext uri="{9D8B030D-6E8A-4147-A177-3AD203B41FA5}">
+                      <a16:colId xmlns:a16="http://schemas.microsoft.com/office/drawing/2014/main" val="2850824769"/>
+                    </a:ext>
+                  </a:extLst>
+                </a:gridCol>
+                <a:gridCol w="208280">
+                  <a:extLst>
+                    <a:ext uri="{9D8B030D-6E8A-4147-A177-3AD203B41FA5}">
+                      <a16:colId xmlns:a16="http://schemas.microsoft.com/office/drawing/2014/main" val="57343624"/>
+                    </a:ext>
+                  </a:extLst>
+                </a:gridCol>
+                <a:gridCol w="208280">
+                  <a:extLst>
+                    <a:ext uri="{9D8B030D-6E8A-4147-A177-3AD203B41FA5}">
+                      <a16:colId xmlns:a16="http://schemas.microsoft.com/office/drawing/2014/main" val="2298198695"/>
+                    </a:ext>
+                  </a:extLst>
+                </a:gridCol>
+                <a:gridCol w="208280">
+                  <a:extLst>
+                    <a:ext uri="{9D8B030D-6E8A-4147-A177-3AD203B41FA5}">
+                      <a16:colId xmlns:a16="http://schemas.microsoft.com/office/drawing/2014/main" val="3269445081"/>
+                    </a:ext>
+                  </a:extLst>
+                </a:gridCol>
+              </a:tblGrid>
+              <a:tr h="0">
+                <a:tc>
+                  <a:txBody>
+                    <a:bodyPr/>
+                    <a:lstStyle/>
+                    <a:p>
+                      <a:endParaRPr lang="en-US" sz="100" dirty="0"/>
+                    </a:p>
+                  </a:txBody>
+                  <a:tcPr/>
+                </a:tc>
+                <a:tc>
+                  <a:txBody>
+                    <a:bodyPr/>
+                    <a:lstStyle/>
+                    <a:p>
+                      <a:endParaRPr lang="en-US" sz="100"/>
+                    </a:p>
+                  </a:txBody>
+                  <a:tcPr/>
+                </a:tc>
+                <a:tc>
+                  <a:txBody>
+                    <a:bodyPr/>
+                    <a:lstStyle/>
+                    <a:p>
+                      <a:endParaRPr lang="en-US" sz="100"/>
+                    </a:p>
+                  </a:txBody>
+                  <a:tcPr/>
+                </a:tc>
+                <a:tc>
+                  <a:txBody>
+                    <a:bodyPr/>
+                    <a:lstStyle/>
+                    <a:p>
+                      <a:endParaRPr lang="en-US" sz="100"/>
+                    </a:p>
+                  </a:txBody>
+                  <a:tcPr/>
+                </a:tc>
+                <a:extLst>
+                  <a:ext uri="{0D108BD9-81ED-4DB2-BD59-A6C34878D82A}">
+                    <a16:rowId xmlns:a16="http://schemas.microsoft.com/office/drawing/2014/main" val="2196600346"/>
+                  </a:ext>
+                </a:extLst>
+              </a:tr>
+              <a:tr h="0">
+                <a:tc>
+                  <a:txBody>
+                    <a:bodyPr/>
+                    <a:lstStyle/>
+                    <a:p>
+                      <a:endParaRPr lang="en-US" sz="100" dirty="0">
+                        <a:solidFill>
+                          <a:srgbClr val="002060"/>
+                        </a:solidFill>
+                        <a:highlight>
+                          <a:srgbClr val="0000FF"/>
+                        </a:highlight>
+                      </a:endParaRPr>
+                    </a:p>
+                  </a:txBody>
+                  <a:tcPr>
+                    <a:solidFill>
+                      <a:srgbClr val="C00000"/>
+                    </a:solidFill>
+                  </a:tcPr>
+                </a:tc>
+                <a:tc>
+                  <a:txBody>
+                    <a:bodyPr/>
+                    <a:lstStyle/>
+                    <a:p>
+                      <a:endParaRPr lang="en-US" sz="100" dirty="0">
+                        <a:solidFill>
+                          <a:srgbClr val="002060"/>
+                        </a:solidFill>
+                        <a:highlight>
+                          <a:srgbClr val="0000FF"/>
+                        </a:highlight>
+                      </a:endParaRPr>
+                    </a:p>
+                  </a:txBody>
+                  <a:tcPr>
+                    <a:solidFill>
+                      <a:srgbClr val="C00000"/>
+                    </a:solidFill>
+                  </a:tcPr>
+                </a:tc>
+                <a:tc>
+                  <a:txBody>
+                    <a:bodyPr/>
+                    <a:lstStyle/>
+                    <a:p>
+                      <a:endParaRPr lang="en-US" sz="100" dirty="0">
+                        <a:solidFill>
+                          <a:srgbClr val="002060"/>
+                        </a:solidFill>
+                        <a:highlight>
+                          <a:srgbClr val="0000FF"/>
+                        </a:highlight>
+                      </a:endParaRPr>
+                    </a:p>
+                  </a:txBody>
+                  <a:tcPr>
+                    <a:solidFill>
+                      <a:srgbClr val="C00000"/>
+                    </a:solidFill>
+                  </a:tcPr>
+                </a:tc>
+                <a:tc>
+                  <a:txBody>
+                    <a:bodyPr/>
+                    <a:lstStyle/>
+                    <a:p>
+                      <a:endParaRPr lang="en-US" sz="100" dirty="0">
+                        <a:solidFill>
+                          <a:srgbClr val="002060"/>
+                        </a:solidFill>
+                        <a:highlight>
+                          <a:srgbClr val="0000FF"/>
+                        </a:highlight>
+                      </a:endParaRPr>
+                    </a:p>
+                  </a:txBody>
+                  <a:tcPr>
+                    <a:solidFill>
+                      <a:srgbClr val="C00000"/>
+                    </a:solidFill>
+                  </a:tcPr>
+                </a:tc>
+                <a:extLst>
+                  <a:ext uri="{0D108BD9-81ED-4DB2-BD59-A6C34878D82A}">
+                    <a16:rowId xmlns:a16="http://schemas.microsoft.com/office/drawing/2014/main" val="1182745223"/>
+                  </a:ext>
+                </a:extLst>
+              </a:tr>
+              <a:tr h="0">
+                <a:tc>
+                  <a:txBody>
+                    <a:bodyPr/>
+                    <a:lstStyle/>
+                    <a:p>
+                      <a:endParaRPr lang="en-US" sz="100" dirty="0">
+                        <a:solidFill>
+                          <a:srgbClr val="002060"/>
+                        </a:solidFill>
+                        <a:highlight>
+                          <a:srgbClr val="0000FF"/>
+                        </a:highlight>
+                      </a:endParaRPr>
+                    </a:p>
+                  </a:txBody>
+                  <a:tcPr>
+                    <a:solidFill>
+                      <a:srgbClr val="C00000"/>
+                    </a:solidFill>
+                  </a:tcPr>
+                </a:tc>
+                <a:tc>
+                  <a:txBody>
+                    <a:bodyPr/>
+                    <a:lstStyle/>
+                    <a:p>
+                      <a:endParaRPr lang="en-US" sz="100" dirty="0">
+                        <a:solidFill>
+                          <a:srgbClr val="002060"/>
+                        </a:solidFill>
+                        <a:highlight>
+                          <a:srgbClr val="0000FF"/>
+                        </a:highlight>
+                      </a:endParaRPr>
+                    </a:p>
+                  </a:txBody>
+                  <a:tcPr>
+                    <a:solidFill>
+                      <a:srgbClr val="C00000"/>
+                    </a:solidFill>
+                  </a:tcPr>
+                </a:tc>
+                <a:tc>
+                  <a:txBody>
+                    <a:bodyPr/>
+                    <a:lstStyle/>
+                    <a:p>
+                      <a:endParaRPr lang="en-US" sz="100" dirty="0">
+                        <a:solidFill>
+                          <a:srgbClr val="002060"/>
+                        </a:solidFill>
+                        <a:highlight>
+                          <a:srgbClr val="0000FF"/>
+                        </a:highlight>
+                      </a:endParaRPr>
+                    </a:p>
+                  </a:txBody>
+                  <a:tcPr>
+                    <a:solidFill>
+                      <a:srgbClr val="C00000"/>
+                    </a:solidFill>
+                  </a:tcPr>
+                </a:tc>
+                <a:tc>
+                  <a:txBody>
+                    <a:bodyPr/>
+                    <a:lstStyle/>
+                    <a:p>
+                      <a:endParaRPr lang="en-US" sz="100" dirty="0">
+                        <a:solidFill>
+                          <a:srgbClr val="002060"/>
+                        </a:solidFill>
+                        <a:highlight>
+                          <a:srgbClr val="0000FF"/>
+                        </a:highlight>
+                      </a:endParaRPr>
+                    </a:p>
+                  </a:txBody>
+                  <a:tcPr>
+                    <a:solidFill>
+                      <a:srgbClr val="C00000"/>
+                    </a:solidFill>
+                  </a:tcPr>
+                </a:tc>
+                <a:extLst>
+                  <a:ext uri="{0D108BD9-81ED-4DB2-BD59-A6C34878D82A}">
+                    <a16:rowId xmlns:a16="http://schemas.microsoft.com/office/drawing/2014/main" val="1211249238"/>
+                  </a:ext>
+                </a:extLst>
+              </a:tr>
+              <a:tr h="0">
+                <a:tc>
+                  <a:txBody>
+                    <a:bodyPr/>
+                    <a:lstStyle/>
+                    <a:p>
+                      <a:endParaRPr lang="en-US" sz="100" dirty="0"/>
+                    </a:p>
+                  </a:txBody>
+                  <a:tcPr>
+                    <a:solidFill>
+                      <a:srgbClr val="C00000"/>
+                    </a:solidFill>
+                  </a:tcPr>
+                </a:tc>
+                <a:tc>
+                  <a:txBody>
+                    <a:bodyPr/>
+                    <a:lstStyle/>
+                    <a:p>
+                      <a:endParaRPr lang="en-US" sz="100" dirty="0"/>
+                    </a:p>
+                  </a:txBody>
+                  <a:tcPr>
+                    <a:solidFill>
+                      <a:srgbClr val="C00000"/>
+                    </a:solidFill>
+                  </a:tcPr>
+                </a:tc>
+                <a:tc>
+                  <a:txBody>
+                    <a:bodyPr/>
+                    <a:lstStyle/>
+                    <a:p>
+                      <a:endParaRPr lang="en-US" sz="100" dirty="0"/>
+                    </a:p>
+                  </a:txBody>
+                  <a:tcPr>
+                    <a:solidFill>
+                      <a:srgbClr val="C00000"/>
+                    </a:solidFill>
+                  </a:tcPr>
+                </a:tc>
+                <a:tc>
+                  <a:txBody>
+                    <a:bodyPr/>
+                    <a:lstStyle/>
+                    <a:p>
+                      <a:endParaRPr lang="en-US" sz="100" dirty="0"/>
+                    </a:p>
+                  </a:txBody>
+                  <a:tcPr>
+                    <a:solidFill>
+                      <a:srgbClr val="C00000"/>
+                    </a:solidFill>
+                  </a:tcPr>
+                </a:tc>
+                <a:extLst>
+                  <a:ext uri="{0D108BD9-81ED-4DB2-BD59-A6C34878D82A}">
+                    <a16:rowId xmlns:a16="http://schemas.microsoft.com/office/drawing/2014/main" val="640380758"/>
+                  </a:ext>
+                </a:extLst>
+              </a:tr>
+            </a:tbl>
+          </a:graphicData>
+        </a:graphic>
+      </p:graphicFrame>
+      <p:sp>
+        <p:nvSpPr>
+          <p:cNvPr id="25" name="TextBox 24">
+            <a:extLst>
+              <a:ext uri="{FF2B5EF4-FFF2-40B4-BE49-F238E27FC236}">
+                <a16:creationId xmlns:a16="http://schemas.microsoft.com/office/drawing/2014/main" id="{6EFF534E-3EF9-6A4E-A5AE-1F9D1F477FF0}"/>
+              </a:ext>
+            </a:extLst>
+          </p:cNvPr>
+          <p:cNvSpPr txBox="1"/>
+          <p:nvPr/>
+        </p:nvSpPr>
+        <p:spPr>
+          <a:xfrm>
+            <a:off x="4724400" y="2286000"/>
+            <a:ext cx="894219" cy="369332"/>
+          </a:xfrm>
+          <a:prstGeom prst="rect">
+            <a:avLst/>
+          </a:prstGeom>
+          <a:noFill/>
+        </p:spPr>
+        <p:txBody>
+          <a:bodyPr wrap="none" rtlCol="0">
+            <a:spAutoFit/>
+          </a:bodyPr>
+          <a:lstStyle/>
+          <a:p>
+            <a:r>
+              <a:rPr lang="en-US" dirty="0"/>
+              <a:t>Train 1</a:t>
+            </a:r>
+          </a:p>
+        </p:txBody>
+      </p:sp>
+      <p:sp>
+        <p:nvSpPr>
+          <p:cNvPr id="26" name="TextBox 25">
+            <a:extLst>
+              <a:ext uri="{FF2B5EF4-FFF2-40B4-BE49-F238E27FC236}">
+                <a16:creationId xmlns:a16="http://schemas.microsoft.com/office/drawing/2014/main" id="{9D4DCE87-3BDA-FA40-A9A1-89695AFD5906}"/>
+              </a:ext>
+            </a:extLst>
+          </p:cNvPr>
+          <p:cNvSpPr txBox="1"/>
+          <p:nvPr/>
+        </p:nvSpPr>
+        <p:spPr>
+          <a:xfrm>
+            <a:off x="5658981" y="2286000"/>
+            <a:ext cx="800284" cy="369332"/>
+          </a:xfrm>
+          <a:prstGeom prst="rect">
+            <a:avLst/>
+          </a:prstGeom>
+          <a:noFill/>
+        </p:spPr>
+        <p:txBody>
+          <a:bodyPr wrap="none" rtlCol="0">
+            <a:spAutoFit/>
+          </a:bodyPr>
+          <a:lstStyle/>
+          <a:p>
+            <a:r>
+              <a:rPr lang="en-US" dirty="0"/>
+              <a:t>Test 1</a:t>
+            </a:r>
+          </a:p>
+        </p:txBody>
+      </p:sp>
+      <p:sp>
+        <p:nvSpPr>
+          <p:cNvPr id="27" name="TextBox 26">
+            <a:extLst>
+              <a:ext uri="{FF2B5EF4-FFF2-40B4-BE49-F238E27FC236}">
+                <a16:creationId xmlns:a16="http://schemas.microsoft.com/office/drawing/2014/main" id="{DAC9227B-135F-5541-A7B4-ED8B6C10FA42}"/>
+              </a:ext>
+            </a:extLst>
+          </p:cNvPr>
+          <p:cNvSpPr txBox="1"/>
+          <p:nvPr/>
+        </p:nvSpPr>
+        <p:spPr>
+          <a:xfrm>
+            <a:off x="7010400" y="2297668"/>
+            <a:ext cx="894219" cy="369332"/>
+          </a:xfrm>
+          <a:prstGeom prst="rect">
+            <a:avLst/>
+          </a:prstGeom>
+          <a:noFill/>
+        </p:spPr>
+        <p:txBody>
+          <a:bodyPr wrap="none" rtlCol="0">
+            <a:spAutoFit/>
+          </a:bodyPr>
+          <a:lstStyle/>
+          <a:p>
+            <a:r>
+              <a:rPr lang="en-US" dirty="0"/>
+              <a:t>Train 2</a:t>
+            </a:r>
+          </a:p>
+        </p:txBody>
+      </p:sp>
+      <p:sp>
+        <p:nvSpPr>
+          <p:cNvPr id="28" name="TextBox 27">
+            <a:extLst>
+              <a:ext uri="{FF2B5EF4-FFF2-40B4-BE49-F238E27FC236}">
+                <a16:creationId xmlns:a16="http://schemas.microsoft.com/office/drawing/2014/main" id="{5655AE9C-FA4B-4044-A3FD-3DDB6C2C60FF}"/>
+              </a:ext>
+            </a:extLst>
+          </p:cNvPr>
+          <p:cNvSpPr txBox="1"/>
+          <p:nvPr/>
+        </p:nvSpPr>
+        <p:spPr>
+          <a:xfrm>
+            <a:off x="7944981" y="2297668"/>
+            <a:ext cx="800284" cy="369332"/>
+          </a:xfrm>
+          <a:prstGeom prst="rect">
+            <a:avLst/>
+          </a:prstGeom>
+          <a:noFill/>
+        </p:spPr>
+        <p:txBody>
+          <a:bodyPr wrap="none" rtlCol="0">
+            <a:spAutoFit/>
+          </a:bodyPr>
+          <a:lstStyle/>
+          <a:p>
+            <a:r>
+              <a:rPr lang="en-US" dirty="0"/>
+              <a:t>Test 2</a:t>
+            </a:r>
+          </a:p>
+        </p:txBody>
+      </p:sp>
+      <mc:AlternateContent xmlns:mc="http://schemas.openxmlformats.org/markup-compatibility/2006">
+        <mc:Choice xmlns:a14="http://schemas.microsoft.com/office/drawing/2010/main" Requires="a14">
+          <p:sp>
+            <p:nvSpPr>
+              <p:cNvPr id="29" name="TextBox 28">
+                <a:extLst>
+                  <a:ext uri="{FF2B5EF4-FFF2-40B4-BE49-F238E27FC236}">
+                    <a16:creationId xmlns:a16="http://schemas.microsoft.com/office/drawing/2014/main" id="{C85B9592-2008-FE4F-8173-D799E3100DBE}"/>
+                  </a:ext>
+                </a:extLst>
+              </p:cNvPr>
+              <p:cNvSpPr txBox="1"/>
+              <p:nvPr/>
+            </p:nvSpPr>
+            <p:spPr>
+              <a:xfrm>
+                <a:off x="5814267" y="4199462"/>
+                <a:ext cx="616836" cy="465961"/>
+              </a:xfrm>
+              <a:prstGeom prst="rect">
+                <a:avLst/>
+              </a:prstGeom>
+              <a:noFill/>
+            </p:spPr>
+            <p:txBody>
+              <a:bodyPr wrap="none" rtlCol="0">
+                <a:spAutoFit/>
+              </a:bodyPr>
+              <a:lstStyle/>
+              <a:p>
+                <a14:m>
+                  <m:oMathPara xmlns:m="http://schemas.openxmlformats.org/officeDocument/2006/math">
+                    <m:oMathParaPr>
+                      <m:jc m:val="centerGroup"/>
+                    </m:oMathParaPr>
+                    <m:oMath xmlns:m="http://schemas.openxmlformats.org/officeDocument/2006/math">
+                      <m:sSubSup>
+                        <m:sSubSupPr>
+                          <m:ctrlPr>
+                            <a:rPr lang="en-US" sz="2400" b="0" i="1" smtClean="0">
+                              <a:latin typeface="Cambria Math" panose="02040503050406030204" pitchFamily="18" charset="0"/>
+                            </a:rPr>
+                          </m:ctrlPr>
+                        </m:sSubSupPr>
+                        <m:e>
+                          <m:r>
+                            <a:rPr lang="en-US" sz="2400" b="0" i="1" smtClean="0">
+                              <a:latin typeface="Cambria Math" panose="02040503050406030204" pitchFamily="18" charset="0"/>
+                            </a:rPr>
+                            <m:t>𝑅</m:t>
+                          </m:r>
+                        </m:e>
+                        <m:sub>
+                          <m:r>
+                            <a:rPr lang="en-US" sz="2400" b="0" i="1" smtClean="0">
+                              <a:latin typeface="Cambria Math" panose="02040503050406030204" pitchFamily="18" charset="0"/>
+                            </a:rPr>
+                            <m:t>1</m:t>
+                          </m:r>
+                        </m:sub>
+                        <m:sup>
+                          <m:r>
+                            <a:rPr lang="en-US" sz="2400" b="0" i="1" smtClean="0">
+                              <a:latin typeface="Cambria Math" panose="02040503050406030204" pitchFamily="18" charset="0"/>
+                            </a:rPr>
+                            <m:t>2</m:t>
+                          </m:r>
+                        </m:sup>
+                      </m:sSubSup>
+                    </m:oMath>
+                  </m:oMathPara>
+                </a14:m>
+                <a:endParaRPr lang="en-US" sz="2400" dirty="0"/>
+              </a:p>
+            </p:txBody>
+          </p:sp>
+        </mc:Choice>
+        <mc:Fallback>
+          <p:sp>
+            <p:nvSpPr>
+              <p:cNvPr id="29" name="TextBox 28">
+                <a:extLst>
+                  <a:ext uri="{FF2B5EF4-FFF2-40B4-BE49-F238E27FC236}">
+                    <a16:creationId xmlns:a16="http://schemas.microsoft.com/office/drawing/2014/main" id="{C85B9592-2008-FE4F-8173-D799E3100DBE}"/>
+                  </a:ext>
+                </a:extLst>
+              </p:cNvPr>
+              <p:cNvSpPr txBox="1">
+                <a:spLocks noRot="1" noChangeAspect="1" noMove="1" noResize="1" noEditPoints="1" noAdjustHandles="1" noChangeArrowheads="1" noChangeShapeType="1" noTextEdit="1"/>
+              </p:cNvSpPr>
+              <p:nvPr/>
+            </p:nvSpPr>
+            <p:spPr>
+              <a:xfrm>
+                <a:off x="5814267" y="4199462"/>
+                <a:ext cx="616836" cy="465961"/>
+              </a:xfrm>
+              <a:prstGeom prst="rect">
+                <a:avLst/>
+              </a:prstGeom>
+              <a:blipFill>
+                <a:blip r:embed="rId2"/>
+                <a:stretch>
+                  <a:fillRect b="-5405"/>
+                </a:stretch>
+              </a:blipFill>
+            </p:spPr>
+            <p:txBody>
+              <a:bodyPr/>
+              <a:lstStyle/>
+              <a:p>
+                <a:r>
+                  <a:rPr lang="en-US">
+                    <a:noFill/>
+                  </a:rPr>
+                  <a:t> </a:t>
+                </a:r>
+              </a:p>
+            </p:txBody>
+          </p:sp>
+        </mc:Fallback>
+      </mc:AlternateContent>
+      <mc:AlternateContent xmlns:mc="http://schemas.openxmlformats.org/markup-compatibility/2006">
+        <mc:Choice xmlns:a14="http://schemas.microsoft.com/office/drawing/2010/main" Requires="a14">
+          <p:sp>
+            <p:nvSpPr>
+              <p:cNvPr id="30" name="TextBox 29">
+                <a:extLst>
+                  <a:ext uri="{FF2B5EF4-FFF2-40B4-BE49-F238E27FC236}">
+                    <a16:creationId xmlns:a16="http://schemas.microsoft.com/office/drawing/2014/main" id="{A83B16B7-2EF0-DC49-813B-500DDD42645E}"/>
+                  </a:ext>
+                </a:extLst>
+              </p:cNvPr>
+              <p:cNvSpPr txBox="1"/>
+              <p:nvPr/>
+            </p:nvSpPr>
+            <p:spPr>
+              <a:xfrm>
+                <a:off x="8024067" y="4202668"/>
+                <a:ext cx="616836" cy="466666"/>
+              </a:xfrm>
+              <a:prstGeom prst="rect">
+                <a:avLst/>
+              </a:prstGeom>
+              <a:noFill/>
+            </p:spPr>
+            <p:txBody>
+              <a:bodyPr wrap="none" rtlCol="0">
+                <a:spAutoFit/>
+              </a:bodyPr>
+              <a:lstStyle/>
+              <a:p>
+                <a14:m>
+                  <m:oMathPara xmlns:m="http://schemas.openxmlformats.org/officeDocument/2006/math">
+                    <m:oMathParaPr>
+                      <m:jc m:val="centerGroup"/>
+                    </m:oMathParaPr>
+                    <m:oMath xmlns:m="http://schemas.openxmlformats.org/officeDocument/2006/math">
+                      <m:sSubSup>
+                        <m:sSubSupPr>
+                          <m:ctrlPr>
+                            <a:rPr lang="en-US" sz="2400" b="0" i="1" smtClean="0">
+                              <a:latin typeface="Cambria Math" panose="02040503050406030204" pitchFamily="18" charset="0"/>
+                            </a:rPr>
+                          </m:ctrlPr>
+                        </m:sSubSupPr>
+                        <m:e>
+                          <m:r>
+                            <a:rPr lang="en-US" sz="2400" b="0" i="1" smtClean="0">
+                              <a:latin typeface="Cambria Math" panose="02040503050406030204" pitchFamily="18" charset="0"/>
+                            </a:rPr>
+                            <m:t>𝑅</m:t>
+                          </m:r>
+                        </m:e>
+                        <m:sub>
+                          <m:r>
+                            <a:rPr lang="en-US" sz="2400" b="0" i="1" smtClean="0">
+                              <a:latin typeface="Cambria Math" panose="02040503050406030204" pitchFamily="18" charset="0"/>
+                            </a:rPr>
+                            <m:t>2</m:t>
+                          </m:r>
+                        </m:sub>
+                        <m:sup>
+                          <m:r>
+                            <a:rPr lang="en-US" sz="2400" b="0" i="1" smtClean="0">
+                              <a:latin typeface="Cambria Math" panose="02040503050406030204" pitchFamily="18" charset="0"/>
+                            </a:rPr>
+                            <m:t>2</m:t>
+                          </m:r>
+                        </m:sup>
+                      </m:sSubSup>
+                    </m:oMath>
+                  </m:oMathPara>
+                </a14:m>
+                <a:endParaRPr lang="en-US" sz="2400" dirty="0"/>
+              </a:p>
+            </p:txBody>
+          </p:sp>
+        </mc:Choice>
+        <mc:Fallback>
+          <p:sp>
+            <p:nvSpPr>
+              <p:cNvPr id="30" name="TextBox 29">
+                <a:extLst>
+                  <a:ext uri="{FF2B5EF4-FFF2-40B4-BE49-F238E27FC236}">
+                    <a16:creationId xmlns:a16="http://schemas.microsoft.com/office/drawing/2014/main" id="{A83B16B7-2EF0-DC49-813B-500DDD42645E}"/>
+                  </a:ext>
+                </a:extLst>
+              </p:cNvPr>
+              <p:cNvSpPr txBox="1">
+                <a:spLocks noRot="1" noChangeAspect="1" noMove="1" noResize="1" noEditPoints="1" noAdjustHandles="1" noChangeArrowheads="1" noChangeShapeType="1" noTextEdit="1"/>
+              </p:cNvSpPr>
+              <p:nvPr/>
+            </p:nvSpPr>
+            <p:spPr>
+              <a:xfrm>
+                <a:off x="8024067" y="4202668"/>
+                <a:ext cx="616836" cy="466666"/>
+              </a:xfrm>
+              <a:prstGeom prst="rect">
+                <a:avLst/>
+              </a:prstGeom>
+              <a:blipFill>
+                <a:blip r:embed="rId3"/>
+                <a:stretch>
+                  <a:fillRect b="-2632"/>
+                </a:stretch>
+              </a:blipFill>
+            </p:spPr>
+            <p:txBody>
+              <a:bodyPr/>
+              <a:lstStyle/>
+              <a:p>
+                <a:r>
+                  <a:rPr lang="en-US">
+                    <a:noFill/>
+                  </a:rPr>
+                  <a:t> </a:t>
+                </a:r>
+              </a:p>
+            </p:txBody>
+          </p:sp>
+        </mc:Fallback>
+      </mc:AlternateContent>
+      <p:cxnSp>
+        <p:nvCxnSpPr>
+          <p:cNvPr id="32" name="Straight Arrow Connector 31">
+            <a:extLst>
+              <a:ext uri="{FF2B5EF4-FFF2-40B4-BE49-F238E27FC236}">
+                <a16:creationId xmlns:a16="http://schemas.microsoft.com/office/drawing/2014/main" id="{B2959467-3409-E04C-9FF8-ECB7310F765C}"/>
+              </a:ext>
+            </a:extLst>
+          </p:cNvPr>
+          <p:cNvCxnSpPr>
+            <a:endCxn id="29" idx="0"/>
+          </p:cNvCxnSpPr>
+          <p:nvPr/>
+        </p:nvCxnSpPr>
+        <p:spPr>
+          <a:xfrm flipH="1">
+            <a:off x="6122685" y="3144520"/>
+            <a:ext cx="8875" cy="1054942"/>
+          </a:xfrm>
+          <a:prstGeom prst="straightConnector1">
+            <a:avLst/>
+          </a:prstGeom>
+          <a:ln>
+            <a:tailEnd type="triangle"/>
+          </a:ln>
+        </p:spPr>
+        <p:style>
+          <a:lnRef idx="2">
+            <a:schemeClr val="accent1"/>
+          </a:lnRef>
+          <a:fillRef idx="0">
+            <a:schemeClr val="accent1"/>
+          </a:fillRef>
+          <a:effectRef idx="1">
+            <a:schemeClr val="accent1"/>
+          </a:effectRef>
+          <a:fontRef idx="minor">
+            <a:schemeClr val="tx1"/>
+          </a:fontRef>
+        </p:style>
+      </p:cxnSp>
+      <p:cxnSp>
+        <p:nvCxnSpPr>
+          <p:cNvPr id="33" name="Straight Arrow Connector 32">
+            <a:extLst>
+              <a:ext uri="{FF2B5EF4-FFF2-40B4-BE49-F238E27FC236}">
+                <a16:creationId xmlns:a16="http://schemas.microsoft.com/office/drawing/2014/main" id="{5BD2F85C-1DF6-D245-AB0D-02CE994C72E7}"/>
+              </a:ext>
+            </a:extLst>
+          </p:cNvPr>
+          <p:cNvCxnSpPr/>
+          <p:nvPr/>
+        </p:nvCxnSpPr>
+        <p:spPr>
+          <a:xfrm flipH="1">
+            <a:off x="8296925" y="3124200"/>
+            <a:ext cx="8875" cy="1054942"/>
+          </a:xfrm>
+          <a:prstGeom prst="straightConnector1">
+            <a:avLst/>
+          </a:prstGeom>
+          <a:ln>
+            <a:tailEnd type="triangle"/>
+          </a:ln>
+        </p:spPr>
+        <p:style>
+          <a:lnRef idx="2">
+            <a:schemeClr val="accent1"/>
+          </a:lnRef>
+          <a:fillRef idx="0">
+            <a:schemeClr val="accent1"/>
+          </a:fillRef>
+          <a:effectRef idx="1">
+            <a:schemeClr val="accent1"/>
+          </a:effectRef>
+          <a:fontRef idx="minor">
+            <a:schemeClr val="tx1"/>
+          </a:fontRef>
+        </p:style>
+      </p:cxnSp>
+      <mc:AlternateContent xmlns:mc="http://schemas.openxmlformats.org/markup-compatibility/2006">
+        <mc:Choice xmlns:a14="http://schemas.microsoft.com/office/drawing/2010/main" Requires="a14">
+          <p:sp>
+            <p:nvSpPr>
+              <p:cNvPr id="34" name="TextBox 33">
+                <a:extLst>
+                  <a:ext uri="{FF2B5EF4-FFF2-40B4-BE49-F238E27FC236}">
+                    <a16:creationId xmlns:a16="http://schemas.microsoft.com/office/drawing/2014/main" id="{547EAC54-57D4-4D43-B930-80577ED91A00}"/>
+                  </a:ext>
+                </a:extLst>
+              </p:cNvPr>
+              <p:cNvSpPr txBox="1"/>
+              <p:nvPr/>
+            </p:nvSpPr>
+            <p:spPr>
+              <a:xfrm>
+                <a:off x="6245958" y="5410200"/>
+                <a:ext cx="1145442" cy="744499"/>
+              </a:xfrm>
+              <a:prstGeom prst="rect">
+                <a:avLst/>
+              </a:prstGeom>
+              <a:noFill/>
+            </p:spPr>
+            <p:txBody>
+              <a:bodyPr wrap="none" lIns="0" tIns="0" rIns="0" bIns="0" rtlCol="0">
+                <a:spAutoFit/>
+              </a:bodyPr>
+              <a:lstStyle/>
+              <a:p>
+                <a14:m>
+                  <m:oMathPara xmlns:m="http://schemas.openxmlformats.org/officeDocument/2006/math">
+                    <m:oMathParaPr>
+                      <m:jc m:val="centerGroup"/>
+                    </m:oMathParaPr>
+                    <m:oMath xmlns:m="http://schemas.openxmlformats.org/officeDocument/2006/math">
+                      <m:f>
+                        <m:fPr>
+                          <m:ctrlPr>
+                            <a:rPr lang="en-US" sz="2400" b="0" i="1" smtClean="0">
+                              <a:latin typeface="Cambria Math" panose="02040503050406030204" pitchFamily="18" charset="0"/>
+                            </a:rPr>
+                          </m:ctrlPr>
+                        </m:fPr>
+                        <m:num>
+                          <m:sSubSup>
+                            <m:sSubSupPr>
+                              <m:ctrlPr>
+                                <a:rPr lang="en-US" sz="2400" b="0" i="1" smtClean="0">
+                                  <a:latin typeface="Cambria Math" panose="02040503050406030204" pitchFamily="18" charset="0"/>
+                                </a:rPr>
+                              </m:ctrlPr>
+                            </m:sSubSupPr>
+                            <m:e>
+                              <m:r>
+                                <a:rPr lang="en-US" sz="2400" b="0" i="1" smtClean="0">
+                                  <a:latin typeface="Cambria Math" panose="02040503050406030204" pitchFamily="18" charset="0"/>
+                                </a:rPr>
+                                <m:t>𝑅</m:t>
+                              </m:r>
+                            </m:e>
+                            <m:sub>
+                              <m:r>
+                                <a:rPr lang="en-US" sz="2400" b="0" i="1" smtClean="0">
+                                  <a:latin typeface="Cambria Math" panose="02040503050406030204" pitchFamily="18" charset="0"/>
+                                </a:rPr>
+                                <m:t>1</m:t>
+                              </m:r>
+                            </m:sub>
+                            <m:sup>
+                              <m:r>
+                                <a:rPr lang="en-US" sz="2400" b="0" i="1" smtClean="0">
+                                  <a:latin typeface="Cambria Math" panose="02040503050406030204" pitchFamily="18" charset="0"/>
+                                </a:rPr>
+                                <m:t>2</m:t>
+                              </m:r>
+                            </m:sup>
+                          </m:sSubSup>
+                          <m:r>
+                            <a:rPr lang="en-US" sz="2400" b="0" i="1" smtClean="0">
+                              <a:latin typeface="Cambria Math" panose="02040503050406030204" pitchFamily="18" charset="0"/>
+                            </a:rPr>
+                            <m:t>+</m:t>
+                          </m:r>
+                          <m:sSubSup>
+                            <m:sSubSupPr>
+                              <m:ctrlPr>
+                                <a:rPr lang="en-US" sz="2400" b="0" i="1" smtClean="0">
+                                  <a:latin typeface="Cambria Math" panose="02040503050406030204" pitchFamily="18" charset="0"/>
+                                </a:rPr>
+                              </m:ctrlPr>
+                            </m:sSubSupPr>
+                            <m:e>
+                              <m:r>
+                                <a:rPr lang="en-US" sz="2400" b="0" i="1" smtClean="0">
+                                  <a:latin typeface="Cambria Math" panose="02040503050406030204" pitchFamily="18" charset="0"/>
+                                </a:rPr>
+                                <m:t>𝑅</m:t>
+                              </m:r>
+                            </m:e>
+                            <m:sub>
+                              <m:r>
+                                <a:rPr lang="en-US" sz="2400" b="0" i="1" smtClean="0">
+                                  <a:latin typeface="Cambria Math" panose="02040503050406030204" pitchFamily="18" charset="0"/>
+                                </a:rPr>
+                                <m:t>2</m:t>
+                              </m:r>
+                            </m:sub>
+                            <m:sup>
+                              <m:r>
+                                <a:rPr lang="en-US" sz="2400" b="0" i="1" smtClean="0">
+                                  <a:latin typeface="Cambria Math" panose="02040503050406030204" pitchFamily="18" charset="0"/>
+                                </a:rPr>
+                                <m:t>2</m:t>
+                              </m:r>
+                            </m:sup>
+                          </m:sSubSup>
+                        </m:num>
+                        <m:den>
+                          <m:r>
+                            <a:rPr lang="en-US" sz="2400" b="0" i="1" smtClean="0">
+                              <a:latin typeface="Cambria Math" panose="02040503050406030204" pitchFamily="18" charset="0"/>
+                            </a:rPr>
+                            <m:t>2</m:t>
+                          </m:r>
+                        </m:den>
+                      </m:f>
+                    </m:oMath>
+                  </m:oMathPara>
+                </a14:m>
+                <a:endParaRPr lang="en-US" sz="2400" dirty="0"/>
+              </a:p>
+            </p:txBody>
+          </p:sp>
+        </mc:Choice>
+        <mc:Fallback>
+          <p:sp>
+            <p:nvSpPr>
+              <p:cNvPr id="34" name="TextBox 33">
+                <a:extLst>
+                  <a:ext uri="{FF2B5EF4-FFF2-40B4-BE49-F238E27FC236}">
+                    <a16:creationId xmlns:a16="http://schemas.microsoft.com/office/drawing/2014/main" id="{547EAC54-57D4-4D43-B930-80577ED91A00}"/>
+                  </a:ext>
+                </a:extLst>
+              </p:cNvPr>
+              <p:cNvSpPr txBox="1">
+                <a:spLocks noRot="1" noChangeAspect="1" noMove="1" noResize="1" noEditPoints="1" noAdjustHandles="1" noChangeArrowheads="1" noChangeShapeType="1" noTextEdit="1"/>
+              </p:cNvSpPr>
+              <p:nvPr/>
+            </p:nvSpPr>
+            <p:spPr>
+              <a:xfrm>
+                <a:off x="6245958" y="5410200"/>
+                <a:ext cx="1145442" cy="744499"/>
+              </a:xfrm>
+              <a:prstGeom prst="rect">
+                <a:avLst/>
+              </a:prstGeom>
+              <a:blipFill>
+                <a:blip r:embed="rId4"/>
+                <a:stretch>
+                  <a:fillRect l="-5556" r="-1111" b="-11667"/>
+                </a:stretch>
+              </a:blipFill>
+            </p:spPr>
+            <p:txBody>
+              <a:bodyPr/>
+              <a:lstStyle/>
+              <a:p>
+                <a:r>
+                  <a:rPr lang="en-US">
+                    <a:noFill/>
+                  </a:rPr>
+                  <a:t> </a:t>
+                </a:r>
+              </a:p>
+            </p:txBody>
+          </p:sp>
+        </mc:Fallback>
+      </mc:AlternateContent>
+      <p:cxnSp>
+        <p:nvCxnSpPr>
+          <p:cNvPr id="36" name="Straight Arrow Connector 35">
+            <a:extLst>
+              <a:ext uri="{FF2B5EF4-FFF2-40B4-BE49-F238E27FC236}">
+                <a16:creationId xmlns:a16="http://schemas.microsoft.com/office/drawing/2014/main" id="{73818E51-0E2A-9B4A-B7A8-9D55B616D7F6}"/>
+              </a:ext>
+            </a:extLst>
+          </p:cNvPr>
+          <p:cNvCxnSpPr>
+            <a:stCxn id="29" idx="2"/>
+            <a:endCxn id="34" idx="0"/>
+          </p:cNvCxnSpPr>
+          <p:nvPr/>
+        </p:nvCxnSpPr>
+        <p:spPr>
+          <a:xfrm>
+            <a:off x="6122685" y="4665423"/>
+            <a:ext cx="695994" cy="744777"/>
+          </a:xfrm>
+          <a:prstGeom prst="straightConnector1">
+            <a:avLst/>
+          </a:prstGeom>
+          <a:ln>
+            <a:tailEnd type="triangle"/>
+          </a:ln>
+        </p:spPr>
+        <p:style>
+          <a:lnRef idx="2">
+            <a:schemeClr val="accent1"/>
+          </a:lnRef>
+          <a:fillRef idx="0">
+            <a:schemeClr val="accent1"/>
+          </a:fillRef>
+          <a:effectRef idx="1">
+            <a:schemeClr val="accent1"/>
+          </a:effectRef>
+          <a:fontRef idx="minor">
+            <a:schemeClr val="tx1"/>
+          </a:fontRef>
+        </p:style>
+      </p:cxnSp>
+      <p:cxnSp>
+        <p:nvCxnSpPr>
+          <p:cNvPr id="38" name="Straight Arrow Connector 37">
+            <a:extLst>
+              <a:ext uri="{FF2B5EF4-FFF2-40B4-BE49-F238E27FC236}">
+                <a16:creationId xmlns:a16="http://schemas.microsoft.com/office/drawing/2014/main" id="{EEE39C96-9778-6745-B20E-811D7736F66A}"/>
+              </a:ext>
+            </a:extLst>
+          </p:cNvPr>
+          <p:cNvCxnSpPr>
+            <a:stCxn id="30" idx="2"/>
+            <a:endCxn id="34" idx="0"/>
+          </p:cNvCxnSpPr>
+          <p:nvPr/>
+        </p:nvCxnSpPr>
+        <p:spPr>
+          <a:xfrm flipH="1">
+            <a:off x="6818679" y="4669334"/>
+            <a:ext cx="1513806" cy="740866"/>
+          </a:xfrm>
+          <a:prstGeom prst="straightConnector1">
+            <a:avLst/>
+          </a:prstGeom>
+          <a:ln>
+            <a:tailEnd type="triangle"/>
+          </a:ln>
+        </p:spPr>
+        <p:style>
+          <a:lnRef idx="2">
+            <a:schemeClr val="accent1"/>
+          </a:lnRef>
+          <a:fillRef idx="0">
+            <a:schemeClr val="accent1"/>
+          </a:fillRef>
+          <a:effectRef idx="1">
+            <a:schemeClr val="accent1"/>
+          </a:effectRef>
+          <a:fontRef idx="minor">
+            <a:schemeClr val="tx1"/>
+          </a:fontRef>
+        </p:style>
+      </p:cxnSp>
+      <p:cxnSp>
+        <p:nvCxnSpPr>
+          <p:cNvPr id="40" name="Straight Arrow Connector 39">
+            <a:extLst>
+              <a:ext uri="{FF2B5EF4-FFF2-40B4-BE49-F238E27FC236}">
+                <a16:creationId xmlns:a16="http://schemas.microsoft.com/office/drawing/2014/main" id="{8BC62965-4722-BE4D-9152-F89DA0EAC1CF}"/>
+              </a:ext>
+            </a:extLst>
+          </p:cNvPr>
+          <p:cNvCxnSpPr>
+            <a:stCxn id="6" idx="2"/>
+          </p:cNvCxnSpPr>
+          <p:nvPr/>
+        </p:nvCxnSpPr>
+        <p:spPr>
+          <a:xfrm>
+            <a:off x="2590800" y="3505200"/>
+            <a:ext cx="0" cy="457200"/>
+          </a:xfrm>
+          <a:prstGeom prst="straightConnector1">
+            <a:avLst/>
+          </a:prstGeom>
+          <a:ln>
+            <a:tailEnd type="triangle"/>
+          </a:ln>
+        </p:spPr>
+        <p:style>
+          <a:lnRef idx="2">
+            <a:schemeClr val="accent1"/>
+          </a:lnRef>
+          <a:fillRef idx="0">
+            <a:schemeClr val="accent1"/>
+          </a:fillRef>
+          <a:effectRef idx="1">
+            <a:schemeClr val="accent1"/>
+          </a:effectRef>
+          <a:fontRef idx="minor">
+            <a:schemeClr val="tx1"/>
+          </a:fontRef>
+        </p:style>
+      </p:cxnSp>
+    </p:spTree>
+    <p:extLst>
+      <p:ext uri="{BB962C8B-B14F-4D97-AF65-F5344CB8AC3E}">
+        <p14:creationId xmlns:p14="http://schemas.microsoft.com/office/powerpoint/2010/main" val="3211970233"/>
+      </p:ext>
+    </p:extLst>
+  </p:cSld>
+  <p:clrMapOvr>
+    <a:masterClrMapping/>
+  </p:clrMapOvr>
+  <p:timing>
+    <p:tnLst>
+      <p:par>
+        <p:cTn id="1" dur="indefinite" restart="never" nodeType="tmRoot">
+          <p:childTnLst>
+            <p:seq concurrent="1" nextAc="seek">
+              <p:cTn id="2" dur="indefinite" nodeType="mainSeq">
+                <p:childTnLst>
+                  <p:par>
+                    <p:cTn id="3" fill="hold">
+                      <p:stCondLst>
+                        <p:cond delay="indefinite"/>
+                      </p:stCondLst>
+                      <p:childTnLst>
+                        <p:par>
+                          <p:cTn id="4" fill="hold">
+                            <p:stCondLst>
+                              <p:cond delay="0"/>
+                            </p:stCondLst>
+                            <p:childTnLst>
+                              <p:par>
+                                <p:cTn id="5" presetID="1" presetClass="entr" presetSubtype="0" fill="hold" grpId="0" nodeType="clickEffect">
+                                  <p:stCondLst>
+                                    <p:cond delay="0"/>
+                                  </p:stCondLst>
+                                  <p:childTnLst>
+                                    <p:set>
+                                      <p:cBhvr>
+                                        <p:cTn id="6" dur="1" fill="hold">
+                                          <p:stCondLst>
+                                            <p:cond delay="0"/>
+                                          </p:stCondLst>
+                                        </p:cTn>
+                                        <p:tgtEl>
+                                          <p:spTgt spid="5"/>
+                                        </p:tgtEl>
+                                        <p:attrNameLst>
+                                          <p:attrName>style.visibility</p:attrName>
+                                        </p:attrNameLst>
+                                      </p:cBhvr>
+                                      <p:to>
+                                        <p:strVal val="visible"/>
+                                      </p:to>
+                                    </p:set>
+                                  </p:childTnLst>
+                                </p:cTn>
+                              </p:par>
+                              <p:par>
+                                <p:cTn id="7" presetID="1" presetClass="entr" presetSubtype="0" fill="hold" nodeType="withEffect">
+                                  <p:stCondLst>
+                                    <p:cond delay="0"/>
+                                  </p:stCondLst>
+                                  <p:childTnLst>
+                                    <p:set>
+                                      <p:cBhvr>
+                                        <p:cTn id="8" dur="1" fill="hold">
+                                          <p:stCondLst>
+                                            <p:cond delay="0"/>
+                                          </p:stCondLst>
+                                        </p:cTn>
+                                        <p:tgtEl>
+                                          <p:spTgt spid="19"/>
+                                        </p:tgtEl>
+                                        <p:attrNameLst>
+                                          <p:attrName>style.visibility</p:attrName>
+                                        </p:attrNameLst>
+                                      </p:cBhvr>
+                                      <p:to>
+                                        <p:strVal val="visible"/>
+                                      </p:to>
+                                    </p:set>
+                                  </p:childTnLst>
+                                </p:cTn>
+                              </p:par>
+                            </p:childTnLst>
+                          </p:cTn>
+                        </p:par>
+                      </p:childTnLst>
+                    </p:cTn>
+                  </p:par>
+                  <p:par>
+                    <p:cTn id="9" fill="hold">
+                      <p:stCondLst>
+                        <p:cond delay="indefinite"/>
+                      </p:stCondLst>
+                      <p:childTnLst>
+                        <p:par>
+                          <p:cTn id="10" fill="hold">
+                            <p:stCondLst>
+                              <p:cond delay="0"/>
+                            </p:stCondLst>
+                            <p:childTnLst>
+                              <p:par>
+                                <p:cTn id="11" presetID="1" presetClass="entr" presetSubtype="0" fill="hold" grpId="0" nodeType="clickEffect">
+                                  <p:stCondLst>
+                                    <p:cond delay="0"/>
+                                  </p:stCondLst>
+                                  <p:childTnLst>
+                                    <p:set>
+                                      <p:cBhvr>
+                                        <p:cTn id="12" dur="1" fill="hold">
+                                          <p:stCondLst>
+                                            <p:cond delay="0"/>
+                                          </p:stCondLst>
+                                        </p:cTn>
+                                        <p:tgtEl>
+                                          <p:spTgt spid="6"/>
+                                        </p:tgtEl>
+                                        <p:attrNameLst>
+                                          <p:attrName>style.visibility</p:attrName>
+                                        </p:attrNameLst>
+                                      </p:cBhvr>
+                                      <p:to>
+                                        <p:strVal val="visible"/>
+                                      </p:to>
+                                    </p:set>
+                                  </p:childTnLst>
+                                </p:cTn>
+                              </p:par>
+                              <p:par>
+                                <p:cTn id="13" presetID="1" presetClass="entr" presetSubtype="0" fill="hold" nodeType="withEffect">
+                                  <p:stCondLst>
+                                    <p:cond delay="0"/>
+                                  </p:stCondLst>
+                                  <p:childTnLst>
+                                    <p:set>
+                                      <p:cBhvr>
+                                        <p:cTn id="14" dur="1" fill="hold">
+                                          <p:stCondLst>
+                                            <p:cond delay="0"/>
+                                          </p:stCondLst>
+                                        </p:cTn>
+                                        <p:tgtEl>
+                                          <p:spTgt spid="10"/>
+                                        </p:tgtEl>
+                                        <p:attrNameLst>
+                                          <p:attrName>style.visibility</p:attrName>
+                                        </p:attrNameLst>
+                                      </p:cBhvr>
+                                      <p:to>
+                                        <p:strVal val="visible"/>
+                                      </p:to>
+                                    </p:set>
+                                  </p:childTnLst>
+                                </p:cTn>
+                              </p:par>
+                              <p:par>
+                                <p:cTn id="15" presetID="1" presetClass="entr" presetSubtype="0" fill="hold" nodeType="withEffect">
+                                  <p:stCondLst>
+                                    <p:cond delay="0"/>
+                                  </p:stCondLst>
+                                  <p:childTnLst>
+                                    <p:set>
+                                      <p:cBhvr>
+                                        <p:cTn id="16" dur="1" fill="hold">
+                                          <p:stCondLst>
+                                            <p:cond delay="0"/>
+                                          </p:stCondLst>
+                                        </p:cTn>
+                                        <p:tgtEl>
+                                          <p:spTgt spid="20"/>
+                                        </p:tgtEl>
+                                        <p:attrNameLst>
+                                          <p:attrName>style.visibility</p:attrName>
+                                        </p:attrNameLst>
+                                      </p:cBhvr>
+                                      <p:to>
+                                        <p:strVal val="visible"/>
+                                      </p:to>
+                                    </p:set>
+                                  </p:childTnLst>
+                                </p:cTn>
+                              </p:par>
+                              <p:par>
+                                <p:cTn id="17" presetID="1" presetClass="entr" presetSubtype="0" fill="hold" nodeType="withEffect">
+                                  <p:stCondLst>
+                                    <p:cond delay="0"/>
+                                  </p:stCondLst>
+                                  <p:childTnLst>
+                                    <p:set>
+                                      <p:cBhvr>
+                                        <p:cTn id="18" dur="1" fill="hold">
+                                          <p:stCondLst>
+                                            <p:cond delay="0"/>
+                                          </p:stCondLst>
+                                        </p:cTn>
+                                        <p:tgtEl>
+                                          <p:spTgt spid="22"/>
+                                        </p:tgtEl>
+                                        <p:attrNameLst>
+                                          <p:attrName>style.visibility</p:attrName>
+                                        </p:attrNameLst>
+                                      </p:cBhvr>
+                                      <p:to>
+                                        <p:strVal val="visible"/>
+                                      </p:to>
+                                    </p:set>
+                                  </p:childTnLst>
+                                </p:cTn>
+                              </p:par>
+                              <p:par>
+                                <p:cTn id="19" presetID="1" presetClass="entr" presetSubtype="0" fill="hold" nodeType="withEffect">
+                                  <p:stCondLst>
+                                    <p:cond delay="0"/>
+                                  </p:stCondLst>
+                                  <p:childTnLst>
+                                    <p:set>
+                                      <p:cBhvr>
+                                        <p:cTn id="20" dur="1" fill="hold">
+                                          <p:stCondLst>
+                                            <p:cond delay="0"/>
+                                          </p:stCondLst>
+                                        </p:cTn>
+                                        <p:tgtEl>
+                                          <p:spTgt spid="23"/>
+                                        </p:tgtEl>
+                                        <p:attrNameLst>
+                                          <p:attrName>style.visibility</p:attrName>
+                                        </p:attrNameLst>
+                                      </p:cBhvr>
+                                      <p:to>
+                                        <p:strVal val="visible"/>
+                                      </p:to>
+                                    </p:set>
+                                  </p:childTnLst>
+                                </p:cTn>
+                              </p:par>
+                              <p:par>
+                                <p:cTn id="21" presetID="1" presetClass="entr" presetSubtype="0" fill="hold" nodeType="withEffect">
+                                  <p:stCondLst>
+                                    <p:cond delay="0"/>
+                                  </p:stCondLst>
+                                  <p:childTnLst>
+                                    <p:set>
+                                      <p:cBhvr>
+                                        <p:cTn id="22" dur="1" fill="hold">
+                                          <p:stCondLst>
+                                            <p:cond delay="0"/>
+                                          </p:stCondLst>
+                                        </p:cTn>
+                                        <p:tgtEl>
+                                          <p:spTgt spid="24"/>
+                                        </p:tgtEl>
+                                        <p:attrNameLst>
+                                          <p:attrName>style.visibility</p:attrName>
+                                        </p:attrNameLst>
+                                      </p:cBhvr>
+                                      <p:to>
+                                        <p:strVal val="visible"/>
+                                      </p:to>
+                                    </p:set>
+                                  </p:childTnLst>
+                                </p:cTn>
+                              </p:par>
+                              <p:par>
+                                <p:cTn id="23" presetID="1" presetClass="entr" presetSubtype="0" fill="hold" grpId="0" nodeType="withEffect">
+                                  <p:stCondLst>
+                                    <p:cond delay="0"/>
+                                  </p:stCondLst>
+                                  <p:childTnLst>
+                                    <p:set>
+                                      <p:cBhvr>
+                                        <p:cTn id="24" dur="1" fill="hold">
+                                          <p:stCondLst>
+                                            <p:cond delay="0"/>
+                                          </p:stCondLst>
+                                        </p:cTn>
+                                        <p:tgtEl>
+                                          <p:spTgt spid="25"/>
+                                        </p:tgtEl>
+                                        <p:attrNameLst>
+                                          <p:attrName>style.visibility</p:attrName>
+                                        </p:attrNameLst>
+                                      </p:cBhvr>
+                                      <p:to>
+                                        <p:strVal val="visible"/>
+                                      </p:to>
+                                    </p:set>
+                                  </p:childTnLst>
+                                </p:cTn>
+                              </p:par>
+                              <p:par>
+                                <p:cTn id="25" presetID="1" presetClass="entr" presetSubtype="0" fill="hold" grpId="0" nodeType="withEffect">
+                                  <p:stCondLst>
+                                    <p:cond delay="0"/>
+                                  </p:stCondLst>
+                                  <p:childTnLst>
+                                    <p:set>
+                                      <p:cBhvr>
+                                        <p:cTn id="26" dur="1" fill="hold">
+                                          <p:stCondLst>
+                                            <p:cond delay="0"/>
+                                          </p:stCondLst>
+                                        </p:cTn>
+                                        <p:tgtEl>
+                                          <p:spTgt spid="26"/>
+                                        </p:tgtEl>
+                                        <p:attrNameLst>
+                                          <p:attrName>style.visibility</p:attrName>
+                                        </p:attrNameLst>
+                                      </p:cBhvr>
+                                      <p:to>
+                                        <p:strVal val="visible"/>
+                                      </p:to>
+                                    </p:set>
+                                  </p:childTnLst>
+                                </p:cTn>
+                              </p:par>
+                              <p:par>
+                                <p:cTn id="27" presetID="1" presetClass="entr" presetSubtype="0" fill="hold" grpId="0" nodeType="withEffect">
+                                  <p:stCondLst>
+                                    <p:cond delay="0"/>
+                                  </p:stCondLst>
+                                  <p:childTnLst>
+                                    <p:set>
+                                      <p:cBhvr>
+                                        <p:cTn id="28" dur="1" fill="hold">
+                                          <p:stCondLst>
+                                            <p:cond delay="0"/>
+                                          </p:stCondLst>
+                                        </p:cTn>
+                                        <p:tgtEl>
+                                          <p:spTgt spid="27"/>
+                                        </p:tgtEl>
+                                        <p:attrNameLst>
+                                          <p:attrName>style.visibility</p:attrName>
+                                        </p:attrNameLst>
+                                      </p:cBhvr>
+                                      <p:to>
+                                        <p:strVal val="visible"/>
+                                      </p:to>
+                                    </p:set>
+                                  </p:childTnLst>
+                                </p:cTn>
+                              </p:par>
+                              <p:par>
+                                <p:cTn id="29" presetID="1" presetClass="entr" presetSubtype="0" fill="hold" grpId="0" nodeType="withEffect">
+                                  <p:stCondLst>
+                                    <p:cond delay="0"/>
+                                  </p:stCondLst>
+                                  <p:childTnLst>
+                                    <p:set>
+                                      <p:cBhvr>
+                                        <p:cTn id="30" dur="1" fill="hold">
+                                          <p:stCondLst>
+                                            <p:cond delay="0"/>
+                                          </p:stCondLst>
+                                        </p:cTn>
+                                        <p:tgtEl>
+                                          <p:spTgt spid="28"/>
+                                        </p:tgtEl>
+                                        <p:attrNameLst>
+                                          <p:attrName>style.visibility</p:attrName>
+                                        </p:attrNameLst>
+                                      </p:cBhvr>
+                                      <p:to>
+                                        <p:strVal val="visible"/>
+                                      </p:to>
+                                    </p:set>
+                                  </p:childTnLst>
+                                </p:cTn>
+                              </p:par>
+                            </p:childTnLst>
+                          </p:cTn>
+                        </p:par>
+                      </p:childTnLst>
+                    </p:cTn>
+                  </p:par>
+                  <p:par>
+                    <p:cTn id="31" fill="hold">
+                      <p:stCondLst>
+                        <p:cond delay="indefinite"/>
+                      </p:stCondLst>
+                      <p:childTnLst>
+                        <p:par>
+                          <p:cTn id="32" fill="hold">
+                            <p:stCondLst>
+                              <p:cond delay="0"/>
+                            </p:stCondLst>
+                            <p:childTnLst>
+                              <p:par>
+                                <p:cTn id="33" presetID="1" presetClass="entr" presetSubtype="0" fill="hold" grpId="0" nodeType="clickEffect">
+                                  <p:stCondLst>
+                                    <p:cond delay="0"/>
+                                  </p:stCondLst>
+                                  <p:childTnLst>
+                                    <p:set>
+                                      <p:cBhvr>
+                                        <p:cTn id="34" dur="1" fill="hold">
+                                          <p:stCondLst>
+                                            <p:cond delay="0"/>
+                                          </p:stCondLst>
+                                        </p:cTn>
+                                        <p:tgtEl>
+                                          <p:spTgt spid="7"/>
+                                        </p:tgtEl>
+                                        <p:attrNameLst>
+                                          <p:attrName>style.visibility</p:attrName>
+                                        </p:attrNameLst>
+                                      </p:cBhvr>
+                                      <p:to>
+                                        <p:strVal val="visible"/>
+                                      </p:to>
+                                    </p:set>
+                                  </p:childTnLst>
+                                </p:cTn>
+                              </p:par>
+                              <p:par>
+                                <p:cTn id="35" presetID="1" presetClass="entr" presetSubtype="0" fill="hold" grpId="0" nodeType="withEffect">
+                                  <p:stCondLst>
+                                    <p:cond delay="0"/>
+                                  </p:stCondLst>
+                                  <p:childTnLst>
+                                    <p:set>
+                                      <p:cBhvr>
+                                        <p:cTn id="36" dur="1" fill="hold">
+                                          <p:stCondLst>
+                                            <p:cond delay="0"/>
+                                          </p:stCondLst>
+                                        </p:cTn>
+                                        <p:tgtEl>
+                                          <p:spTgt spid="29"/>
+                                        </p:tgtEl>
+                                        <p:attrNameLst>
+                                          <p:attrName>style.visibility</p:attrName>
+                                        </p:attrNameLst>
+                                      </p:cBhvr>
+                                      <p:to>
+                                        <p:strVal val="visible"/>
+                                      </p:to>
+                                    </p:set>
+                                  </p:childTnLst>
+                                </p:cTn>
+                              </p:par>
+                              <p:par>
+                                <p:cTn id="37" presetID="1" presetClass="entr" presetSubtype="0" fill="hold" grpId="0" nodeType="withEffect">
+                                  <p:stCondLst>
+                                    <p:cond delay="0"/>
+                                  </p:stCondLst>
+                                  <p:childTnLst>
+                                    <p:set>
+                                      <p:cBhvr>
+                                        <p:cTn id="38" dur="1" fill="hold">
+                                          <p:stCondLst>
+                                            <p:cond delay="0"/>
+                                          </p:stCondLst>
+                                        </p:cTn>
+                                        <p:tgtEl>
+                                          <p:spTgt spid="30"/>
+                                        </p:tgtEl>
+                                        <p:attrNameLst>
+                                          <p:attrName>style.visibility</p:attrName>
+                                        </p:attrNameLst>
+                                      </p:cBhvr>
+                                      <p:to>
+                                        <p:strVal val="visible"/>
+                                      </p:to>
+                                    </p:set>
+                                  </p:childTnLst>
+                                </p:cTn>
+                              </p:par>
+                              <p:par>
+                                <p:cTn id="39" presetID="1" presetClass="entr" presetSubtype="0" fill="hold" nodeType="withEffect">
+                                  <p:stCondLst>
+                                    <p:cond delay="0"/>
+                                  </p:stCondLst>
+                                  <p:childTnLst>
+                                    <p:set>
+                                      <p:cBhvr>
+                                        <p:cTn id="40" dur="1" fill="hold">
+                                          <p:stCondLst>
+                                            <p:cond delay="0"/>
+                                          </p:stCondLst>
+                                        </p:cTn>
+                                        <p:tgtEl>
+                                          <p:spTgt spid="40"/>
+                                        </p:tgtEl>
+                                        <p:attrNameLst>
+                                          <p:attrName>style.visibility</p:attrName>
+                                        </p:attrNameLst>
+                                      </p:cBhvr>
+                                      <p:to>
+                                        <p:strVal val="visible"/>
+                                      </p:to>
+                                    </p:set>
+                                  </p:childTnLst>
+                                </p:cTn>
+                              </p:par>
+                              <p:par>
+                                <p:cTn id="41" presetID="1" presetClass="entr" presetSubtype="0" fill="hold" nodeType="withEffect">
+                                  <p:stCondLst>
+                                    <p:cond delay="0"/>
+                                  </p:stCondLst>
+                                  <p:childTnLst>
+                                    <p:set>
+                                      <p:cBhvr>
+                                        <p:cTn id="42" dur="1" fill="hold">
+                                          <p:stCondLst>
+                                            <p:cond delay="0"/>
+                                          </p:stCondLst>
+                                        </p:cTn>
+                                        <p:tgtEl>
+                                          <p:spTgt spid="32"/>
+                                        </p:tgtEl>
+                                        <p:attrNameLst>
+                                          <p:attrName>style.visibility</p:attrName>
+                                        </p:attrNameLst>
+                                      </p:cBhvr>
+                                      <p:to>
+                                        <p:strVal val="visible"/>
+                                      </p:to>
+                                    </p:set>
+                                  </p:childTnLst>
+                                </p:cTn>
+                              </p:par>
+                              <p:par>
+                                <p:cTn id="43" presetID="1" presetClass="entr" presetSubtype="0" fill="hold" nodeType="withEffect">
+                                  <p:stCondLst>
+                                    <p:cond delay="0"/>
+                                  </p:stCondLst>
+                                  <p:childTnLst>
+                                    <p:set>
+                                      <p:cBhvr>
+                                        <p:cTn id="44" dur="1" fill="hold">
+                                          <p:stCondLst>
+                                            <p:cond delay="0"/>
+                                          </p:stCondLst>
+                                        </p:cTn>
+                                        <p:tgtEl>
+                                          <p:spTgt spid="33"/>
+                                        </p:tgtEl>
+                                        <p:attrNameLst>
+                                          <p:attrName>style.visibility</p:attrName>
+                                        </p:attrNameLst>
+                                      </p:cBhvr>
+                                      <p:to>
+                                        <p:strVal val="visible"/>
+                                      </p:to>
+                                    </p:set>
+                                  </p:childTnLst>
+                                </p:cTn>
+                              </p:par>
+                            </p:childTnLst>
+                          </p:cTn>
+                        </p:par>
+                      </p:childTnLst>
+                    </p:cTn>
+                  </p:par>
+                  <p:par>
+                    <p:cTn id="45" fill="hold">
+                      <p:stCondLst>
+                        <p:cond delay="indefinite"/>
+                      </p:stCondLst>
+                      <p:childTnLst>
+                        <p:par>
+                          <p:cTn id="46" fill="hold">
+                            <p:stCondLst>
+                              <p:cond delay="0"/>
+                            </p:stCondLst>
+                            <p:childTnLst>
+                              <p:par>
+                                <p:cTn id="47" presetID="1" presetClass="entr" presetSubtype="0" fill="hold" grpId="0" nodeType="clickEffect">
+                                  <p:stCondLst>
+                                    <p:cond delay="0"/>
+                                  </p:stCondLst>
+                                  <p:childTnLst>
+                                    <p:set>
+                                      <p:cBhvr>
+                                        <p:cTn id="48" dur="1" fill="hold">
+                                          <p:stCondLst>
+                                            <p:cond delay="0"/>
+                                          </p:stCondLst>
+                                        </p:cTn>
+                                        <p:tgtEl>
+                                          <p:spTgt spid="8"/>
+                                        </p:tgtEl>
+                                        <p:attrNameLst>
+                                          <p:attrName>style.visibility</p:attrName>
+                                        </p:attrNameLst>
+                                      </p:cBhvr>
+                                      <p:to>
+                                        <p:strVal val="visible"/>
+                                      </p:to>
+                                    </p:set>
+                                  </p:childTnLst>
+                                </p:cTn>
+                              </p:par>
+                              <p:par>
+                                <p:cTn id="49" presetID="1" presetClass="entr" presetSubtype="0" fill="hold" nodeType="withEffect">
+                                  <p:stCondLst>
+                                    <p:cond delay="0"/>
+                                  </p:stCondLst>
+                                  <p:childTnLst>
+                                    <p:set>
+                                      <p:cBhvr>
+                                        <p:cTn id="50" dur="1" fill="hold">
+                                          <p:stCondLst>
+                                            <p:cond delay="0"/>
+                                          </p:stCondLst>
+                                        </p:cTn>
+                                        <p:tgtEl>
+                                          <p:spTgt spid="14"/>
+                                        </p:tgtEl>
+                                        <p:attrNameLst>
+                                          <p:attrName>style.visibility</p:attrName>
+                                        </p:attrNameLst>
+                                      </p:cBhvr>
+                                      <p:to>
+                                        <p:strVal val="visible"/>
+                                      </p:to>
+                                    </p:set>
+                                  </p:childTnLst>
+                                </p:cTn>
+                              </p:par>
+                              <p:par>
+                                <p:cTn id="51" presetID="1" presetClass="entr" presetSubtype="0" fill="hold" grpId="0" nodeType="withEffect">
+                                  <p:stCondLst>
+                                    <p:cond delay="0"/>
+                                  </p:stCondLst>
+                                  <p:childTnLst>
+                                    <p:set>
+                                      <p:cBhvr>
+                                        <p:cTn id="52" dur="1" fill="hold">
+                                          <p:stCondLst>
+                                            <p:cond delay="0"/>
+                                          </p:stCondLst>
+                                        </p:cTn>
+                                        <p:tgtEl>
+                                          <p:spTgt spid="34"/>
+                                        </p:tgtEl>
+                                        <p:attrNameLst>
+                                          <p:attrName>style.visibility</p:attrName>
+                                        </p:attrNameLst>
+                                      </p:cBhvr>
+                                      <p:to>
+                                        <p:strVal val="visible"/>
+                                      </p:to>
+                                    </p:set>
+                                  </p:childTnLst>
+                                </p:cTn>
+                              </p:par>
+                              <p:par>
+                                <p:cTn id="53" presetID="1" presetClass="entr" presetSubtype="0" fill="hold" nodeType="withEffect">
+                                  <p:stCondLst>
+                                    <p:cond delay="0"/>
+                                  </p:stCondLst>
+                                  <p:childTnLst>
+                                    <p:set>
+                                      <p:cBhvr>
+                                        <p:cTn id="54" dur="1" fill="hold">
+                                          <p:stCondLst>
+                                            <p:cond delay="0"/>
+                                          </p:stCondLst>
+                                        </p:cTn>
+                                        <p:tgtEl>
+                                          <p:spTgt spid="36"/>
+                                        </p:tgtEl>
+                                        <p:attrNameLst>
+                                          <p:attrName>style.visibility</p:attrName>
+                                        </p:attrNameLst>
+                                      </p:cBhvr>
+                                      <p:to>
+                                        <p:strVal val="visible"/>
+                                      </p:to>
+                                    </p:set>
+                                  </p:childTnLst>
+                                </p:cTn>
+                              </p:par>
+                              <p:par>
+                                <p:cTn id="55" presetID="1" presetClass="entr" presetSubtype="0" fill="hold" nodeType="withEffect">
+                                  <p:stCondLst>
+                                    <p:cond delay="0"/>
+                                  </p:stCondLst>
+                                  <p:childTnLst>
+                                    <p:set>
+                                      <p:cBhvr>
+                                        <p:cTn id="56" dur="1" fill="hold">
+                                          <p:stCondLst>
+                                            <p:cond delay="0"/>
+                                          </p:stCondLst>
+                                        </p:cTn>
+                                        <p:tgtEl>
+                                          <p:spTgt spid="38"/>
+                                        </p:tgtEl>
+                                        <p:attrNameLst>
+                                          <p:attrName>style.visibility</p:attrName>
+                                        </p:attrNameLst>
+                                      </p:cBhvr>
+                                      <p:to>
+                                        <p:strVal val="visible"/>
+                                      </p:to>
+                                    </p:set>
+                                  </p:childTnLst>
+                                </p:cTn>
+                              </p:par>
+                            </p:childTnLst>
+                          </p:cTn>
+                        </p:par>
+                      </p:childTnLst>
+                    </p:cTn>
+                  </p:par>
+                </p:childTnLst>
+              </p:cTn>
+              <p:prevCondLst>
+                <p:cond evt="onPrev" delay="0">
+                  <p:tgtEl>
+                    <p:sldTgt/>
+                  </p:tgtEl>
+                </p:cond>
+              </p:prevCondLst>
+              <p:nextCondLst>
+                <p:cond evt="onNext" delay="0">
+                  <p:tgtEl>
+                    <p:sldTgt/>
+                  </p:tgtEl>
+                </p:cond>
+              </p:nextCondLst>
+            </p:seq>
+          </p:childTnLst>
+        </p:cTn>
+      </p:par>
+    </p:tnLst>
+    <p:bldLst>
+      <p:bldP spid="5" grpId="0" animBg="1"/>
+      <p:bldP spid="6" grpId="0" animBg="1"/>
+      <p:bldP spid="7" grpId="0" animBg="1"/>
+      <p:bldP spid="8" grpId="0" animBg="1"/>
+      <p:bldP spid="25" grpId="0"/>
+      <p:bldP spid="26" grpId="0"/>
+      <p:bldP spid="27" grpId="0"/>
+      <p:bldP spid="28" grpId="0"/>
+      <p:bldP spid="29" grpId="0"/>
+      <p:bldP spid="30" grpId="0"/>
+      <p:bldP spid="34" grpId="0"/>
+    </p:bldLst>
+  </p:timing>
+</p:sld>
+</file>
+
+<file path=ppt/slides/slide5.xml><?xml version="1.0" encoding="utf-8"?>
+<p:sld xmlns:a="http://schemas.openxmlformats.org/drawingml/2006/main" xmlns:r="http://schemas.openxmlformats.org/officeDocument/2006/relationships" xmlns:p="http://schemas.openxmlformats.org/presentationml/2006/main">
+  <p:cSld>
+    <p:spTree>
+      <p:nvGrpSpPr>
+        <p:cNvPr id="1" name=""/>
+        <p:cNvGrpSpPr/>
+        <p:nvPr/>
+      </p:nvGrpSpPr>
+      <p:grpSpPr>
+        <a:xfrm>
+          <a:off x="0" y="0"/>
+          <a:ext cx="0" cy="0"/>
+          <a:chOff x="0" y="0"/>
+          <a:chExt cx="0" cy="0"/>
+        </a:xfrm>
+      </p:grpSpPr>
+      <p:sp>
+        <p:nvSpPr>
+          <p:cNvPr id="2" name="Title 1">
+            <a:extLst>
+              <a:ext uri="{FF2B5EF4-FFF2-40B4-BE49-F238E27FC236}">
+                <a16:creationId xmlns:a16="http://schemas.microsoft.com/office/drawing/2014/main" id="{34F63FE1-0219-A344-BD0A-D047CF371BF1}"/>
+              </a:ext>
+            </a:extLst>
+          </p:cNvPr>
+          <p:cNvSpPr>
+            <a:spLocks noGrp="1"/>
+          </p:cNvSpPr>
+          <p:nvPr>
+            <p:ph type="title"/>
+          </p:nvPr>
+        </p:nvSpPr>
+        <p:spPr/>
+        <p:txBody>
+          <a:bodyPr/>
+          <a:lstStyle/>
+          <a:p>
+            <a:r>
+              <a:rPr lang="en-US" dirty="0"/>
+              <a:t>Python Generators</a:t>
+            </a:r>
+          </a:p>
+        </p:txBody>
+      </p:sp>
+      <p:sp>
+        <p:nvSpPr>
+          <p:cNvPr id="3" name="Content Placeholder 2">
+            <a:extLst>
+              <a:ext uri="{FF2B5EF4-FFF2-40B4-BE49-F238E27FC236}">
+                <a16:creationId xmlns:a16="http://schemas.microsoft.com/office/drawing/2014/main" id="{06E26EC7-F388-314F-94D6-AC9AF3082425}"/>
+              </a:ext>
+            </a:extLst>
+          </p:cNvPr>
+          <p:cNvSpPr>
+            <a:spLocks noGrp="1"/>
+          </p:cNvSpPr>
+          <p:nvPr>
+            <p:ph idx="1"/>
+          </p:nvPr>
+        </p:nvSpPr>
+        <p:spPr/>
+        <p:txBody>
+          <a:bodyPr/>
+          <a:lstStyle/>
+          <a:p>
+            <a:endParaRPr lang="en-US"/>
+          </a:p>
+        </p:txBody>
+      </p:sp>
+      <p:sp>
+        <p:nvSpPr>
+          <p:cNvPr id="4" name="Slide Number Placeholder 3">
+            <a:extLst>
+              <a:ext uri="{FF2B5EF4-FFF2-40B4-BE49-F238E27FC236}">
+                <a16:creationId xmlns:a16="http://schemas.microsoft.com/office/drawing/2014/main" id="{84ECBEE2-6666-7341-B916-EFB957592D70}"/>
+              </a:ext>
+            </a:extLst>
+          </p:cNvPr>
+          <p:cNvSpPr>
+            <a:spLocks noGrp="1"/>
+          </p:cNvSpPr>
+          <p:nvPr>
+            <p:ph type="sldNum" sz="quarter" idx="11"/>
+          </p:nvPr>
+        </p:nvSpPr>
+        <p:spPr/>
+        <p:txBody>
+          <a:bodyPr/>
+          <a:lstStyle/>
+          <a:p>
+            <a:pPr>
+              <a:defRPr/>
+            </a:pPr>
+            <a:fld id="{3EF4E9CC-9D91-476E-91FD-5BEEC1642931}" type="slidenum">
+              <a:rPr lang="en-US" altLang="x-none" smtClean="0"/>
+              <a:pPr>
+                <a:defRPr/>
+              </a:pPr>
+              <a:t>5</a:t>
+            </a:fld>
+            <a:endParaRPr lang="en-US" altLang="x-none"/>
+          </a:p>
+        </p:txBody>
+      </p:sp>
+    </p:spTree>
+    <p:extLst>
+      <p:ext uri="{BB962C8B-B14F-4D97-AF65-F5344CB8AC3E}">
+        <p14:creationId xmlns:p14="http://schemas.microsoft.com/office/powerpoint/2010/main" val="3836241286"/>
+      </p:ext>
+    </p:extLst>
+  </p:cSld>
+  <p:clrMapOvr>
+    <a:masterClrMapping/>
+  </p:clrMapOvr>
+</p:sld>
+</file>
+
+<file path=ppt/slides/slide6.xml><?xml version="1.0" encoding="utf-8"?>
+<p:sld xmlns:a="http://schemas.openxmlformats.org/drawingml/2006/main" xmlns:r="http://schemas.openxmlformats.org/officeDocument/2006/relationships" xmlns:p="http://schemas.openxmlformats.org/presentationml/2006/main">
+  <p:cSld>
+    <p:spTree>
+      <p:nvGrpSpPr>
+        <p:cNvPr id="1" name=""/>
+        <p:cNvGrpSpPr/>
+        <p:nvPr/>
+      </p:nvGrpSpPr>
+      <p:grpSpPr>
+        <a:xfrm>
+          <a:off x="0" y="0"/>
+          <a:ext cx="0" cy="0"/>
+          <a:chOff x="0" y="0"/>
+          <a:chExt cx="0" cy="0"/>
+        </a:xfrm>
+      </p:grpSpPr>
+      <p:sp>
+        <p:nvSpPr>
+          <p:cNvPr id="2" name="Title 1">
+            <a:extLst>
+              <a:ext uri="{FF2B5EF4-FFF2-40B4-BE49-F238E27FC236}">
+                <a16:creationId xmlns:a16="http://schemas.microsoft.com/office/drawing/2014/main" id="{D3615835-FFCF-FA45-BF22-1AAA8B1FE8FF}"/>
+              </a:ext>
+            </a:extLst>
+          </p:cNvPr>
+          <p:cNvSpPr>
+            <a:spLocks noGrp="1"/>
+          </p:cNvSpPr>
+          <p:nvPr>
+            <p:ph type="title"/>
+          </p:nvPr>
+        </p:nvSpPr>
+        <p:spPr/>
+        <p:txBody>
+          <a:bodyPr/>
+          <a:lstStyle/>
+          <a:p>
+            <a:r>
+              <a:rPr lang="en-US" dirty="0"/>
+              <a:t>Creating Folds Using Generators</a:t>
+            </a:r>
+          </a:p>
+        </p:txBody>
+      </p:sp>
+      <p:sp>
+        <p:nvSpPr>
+          <p:cNvPr id="3" name="Content Placeholder 2">
+            <a:extLst>
+              <a:ext uri="{FF2B5EF4-FFF2-40B4-BE49-F238E27FC236}">
+                <a16:creationId xmlns:a16="http://schemas.microsoft.com/office/drawing/2014/main" id="{37A0E4EF-ED60-E746-9460-6F234B4741EF}"/>
+              </a:ext>
+            </a:extLst>
+          </p:cNvPr>
+          <p:cNvSpPr>
+            <a:spLocks noGrp="1"/>
+          </p:cNvSpPr>
+          <p:nvPr>
+            <p:ph idx="1"/>
+          </p:nvPr>
+        </p:nvSpPr>
+        <p:spPr/>
+        <p:txBody>
+          <a:bodyPr/>
+          <a:lstStyle/>
+          <a:p>
+            <a:endParaRPr lang="en-US"/>
+          </a:p>
+        </p:txBody>
+      </p:sp>
+      <p:sp>
+        <p:nvSpPr>
+          <p:cNvPr id="4" name="Slide Number Placeholder 3">
+            <a:extLst>
+              <a:ext uri="{FF2B5EF4-FFF2-40B4-BE49-F238E27FC236}">
+                <a16:creationId xmlns:a16="http://schemas.microsoft.com/office/drawing/2014/main" id="{84435B90-D11A-3F4B-9A88-6FD321E2BBE5}"/>
+              </a:ext>
+            </a:extLst>
+          </p:cNvPr>
+          <p:cNvSpPr>
+            <a:spLocks noGrp="1"/>
+          </p:cNvSpPr>
+          <p:nvPr>
+            <p:ph type="sldNum" sz="quarter" idx="11"/>
+          </p:nvPr>
+        </p:nvSpPr>
+        <p:spPr/>
+        <p:txBody>
+          <a:bodyPr/>
+          <a:lstStyle/>
+          <a:p>
+            <a:pPr>
+              <a:defRPr/>
+            </a:pPr>
+            <a:fld id="{3EF4E9CC-9D91-476E-91FD-5BEEC1642931}" type="slidenum">
+              <a:rPr lang="en-US" altLang="x-none" smtClean="0"/>
+              <a:pPr>
+                <a:defRPr/>
+              </a:pPr>
+              <a:t>6</a:t>
+            </a:fld>
+            <a:endParaRPr lang="en-US" altLang="x-none"/>
+          </a:p>
+        </p:txBody>
+      </p:sp>
+    </p:spTree>
+    <p:extLst>
+      <p:ext uri="{BB962C8B-B14F-4D97-AF65-F5344CB8AC3E}">
+        <p14:creationId xmlns:p14="http://schemas.microsoft.com/office/powerpoint/2010/main" val="2312578398"/>
       </p:ext>
     </p:extLst>
   </p:cSld>

</xml_diff>